<commit_message>
Dissertation intro draft finished - power point also about 50%
</commit_message>
<xml_diff>
--- a/- Presentations/Final Year Project - Progress Presentation.pptx
+++ b/- Presentations/Final Year Project - Progress Presentation.pptx
@@ -4,11 +4,14 @@
   <p:sldMasterIdLst>
     <p:sldMasterId id="2147483648" r:id="rId1"/>
   </p:sldMasterIdLst>
+  <p:notesMasterIdLst>
+    <p:notesMasterId r:id="rId11"/>
+  </p:notesMasterIdLst>
   <p:sldIdLst>
     <p:sldId id="256" r:id="rId2"/>
     <p:sldId id="258" r:id="rId3"/>
-    <p:sldId id="257" r:id="rId4"/>
-    <p:sldId id="264" r:id="rId5"/>
+    <p:sldId id="264" r:id="rId4"/>
+    <p:sldId id="257" r:id="rId5"/>
     <p:sldId id="263" r:id="rId6"/>
     <p:sldId id="259" r:id="rId7"/>
     <p:sldId id="260" r:id="rId8"/>
@@ -112,7 +115,637 @@
       </a:defRPr>
     </a:lvl9pPr>
   </p:defaultTextStyle>
+  <p:extLst>
+    <p:ext uri="{EFAFB233-063F-42B5-8137-9DF3F51BA10A}">
+      <p15:sldGuideLst xmlns:p15="http://schemas.microsoft.com/office/powerpoint/2012/main"/>
+    </p:ext>
+  </p:extLst>
 </p:presentation>
+</file>
+
+<file path=ppt/notesMasters/notesMaster1.xml><?xml version="1.0" encoding="utf-8"?>
+<p:notesMaster xmlns:a="http://schemas.openxmlformats.org/drawingml/2006/main" xmlns:r="http://schemas.openxmlformats.org/officeDocument/2006/relationships" xmlns:p="http://schemas.openxmlformats.org/presentationml/2006/main">
+  <p:cSld>
+    <p:bg>
+      <p:bgRef idx="1001">
+        <a:schemeClr val="bg1"/>
+      </p:bgRef>
+    </p:bg>
+    <p:spTree>
+      <p:nvGrpSpPr>
+        <p:cNvPr id="1" name=""/>
+        <p:cNvGrpSpPr/>
+        <p:nvPr/>
+      </p:nvGrpSpPr>
+      <p:grpSpPr>
+        <a:xfrm>
+          <a:off x="0" y="0"/>
+          <a:ext cx="0" cy="0"/>
+          <a:chOff x="0" y="0"/>
+          <a:chExt cx="0" cy="0"/>
+        </a:xfrm>
+      </p:grpSpPr>
+      <p:sp>
+        <p:nvSpPr>
+          <p:cNvPr id="2" name="Header Placeholder 1"/>
+          <p:cNvSpPr>
+            <a:spLocks noGrp="1"/>
+          </p:cNvSpPr>
+          <p:nvPr>
+            <p:ph type="hdr" sz="quarter"/>
+          </p:nvPr>
+        </p:nvSpPr>
+        <p:spPr>
+          <a:xfrm>
+            <a:off x="0" y="0"/>
+            <a:ext cx="2971800" cy="458788"/>
+          </a:xfrm>
+          <a:prstGeom prst="rect">
+            <a:avLst/>
+          </a:prstGeom>
+        </p:spPr>
+        <p:txBody>
+          <a:bodyPr vert="horz" lIns="91440" tIns="45720" rIns="91440" bIns="45720" rtlCol="0"/>
+          <a:lstStyle>
+            <a:lvl1pPr algn="l">
+              <a:defRPr sz="1200"/>
+            </a:lvl1pPr>
+          </a:lstStyle>
+          <a:p>
+            <a:endParaRPr lang="en-GB"/>
+          </a:p>
+        </p:txBody>
+      </p:sp>
+      <p:sp>
+        <p:nvSpPr>
+          <p:cNvPr id="3" name="Date Placeholder 2"/>
+          <p:cNvSpPr>
+            <a:spLocks noGrp="1"/>
+          </p:cNvSpPr>
+          <p:nvPr>
+            <p:ph type="dt" idx="1"/>
+          </p:nvPr>
+        </p:nvSpPr>
+        <p:spPr>
+          <a:xfrm>
+            <a:off x="3884613" y="0"/>
+            <a:ext cx="2971800" cy="458788"/>
+          </a:xfrm>
+          <a:prstGeom prst="rect">
+            <a:avLst/>
+          </a:prstGeom>
+        </p:spPr>
+        <p:txBody>
+          <a:bodyPr vert="horz" lIns="91440" tIns="45720" rIns="91440" bIns="45720" rtlCol="0"/>
+          <a:lstStyle>
+            <a:lvl1pPr algn="r">
+              <a:defRPr sz="1200"/>
+            </a:lvl1pPr>
+          </a:lstStyle>
+          <a:p>
+            <a:fld id="{0FB2CF12-C102-4E48-8DD4-3F0624D60D82}" type="datetimeFigureOut">
+              <a:rPr lang="en-GB" smtClean="0"/>
+              <a:t>20/03/2022</a:t>
+            </a:fld>
+            <a:endParaRPr lang="en-GB"/>
+          </a:p>
+        </p:txBody>
+      </p:sp>
+      <p:sp>
+        <p:nvSpPr>
+          <p:cNvPr id="4" name="Slide Image Placeholder 3"/>
+          <p:cNvSpPr>
+            <a:spLocks noGrp="1" noRot="1" noChangeAspect="1"/>
+          </p:cNvSpPr>
+          <p:nvPr>
+            <p:ph type="sldImg" idx="2"/>
+          </p:nvPr>
+        </p:nvSpPr>
+        <p:spPr>
+          <a:xfrm>
+            <a:off x="685800" y="1143000"/>
+            <a:ext cx="5486400" cy="3086100"/>
+          </a:xfrm>
+          <a:prstGeom prst="rect">
+            <a:avLst/>
+          </a:prstGeom>
+          <a:noFill/>
+          <a:ln w="12700">
+            <a:solidFill>
+              <a:prstClr val="black"/>
+            </a:solidFill>
+          </a:ln>
+        </p:spPr>
+        <p:txBody>
+          <a:bodyPr vert="horz" lIns="91440" tIns="45720" rIns="91440" bIns="45720" rtlCol="0" anchor="ctr"/>
+          <a:lstStyle/>
+          <a:p>
+            <a:endParaRPr lang="en-GB"/>
+          </a:p>
+        </p:txBody>
+      </p:sp>
+      <p:sp>
+        <p:nvSpPr>
+          <p:cNvPr id="5" name="Notes Placeholder 4"/>
+          <p:cNvSpPr>
+            <a:spLocks noGrp="1"/>
+          </p:cNvSpPr>
+          <p:nvPr>
+            <p:ph type="body" sz="quarter" idx="3"/>
+          </p:nvPr>
+        </p:nvSpPr>
+        <p:spPr>
+          <a:xfrm>
+            <a:off x="685800" y="4400550"/>
+            <a:ext cx="5486400" cy="3600450"/>
+          </a:xfrm>
+          <a:prstGeom prst="rect">
+            <a:avLst/>
+          </a:prstGeom>
+        </p:spPr>
+        <p:txBody>
+          <a:bodyPr vert="horz" lIns="91440" tIns="45720" rIns="91440" bIns="45720" rtlCol="0"/>
+          <a:lstStyle/>
+          <a:p>
+            <a:pPr lvl="0"/>
+            <a:r>
+              <a:rPr lang="en-US"/>
+              <a:t>Click to edit Master text styles</a:t>
+            </a:r>
+          </a:p>
+          <a:p>
+            <a:pPr lvl="1"/>
+            <a:r>
+              <a:rPr lang="en-US"/>
+              <a:t>Second level</a:t>
+            </a:r>
+          </a:p>
+          <a:p>
+            <a:pPr lvl="2"/>
+            <a:r>
+              <a:rPr lang="en-US"/>
+              <a:t>Third level</a:t>
+            </a:r>
+          </a:p>
+          <a:p>
+            <a:pPr lvl="3"/>
+            <a:r>
+              <a:rPr lang="en-US"/>
+              <a:t>Fourth level</a:t>
+            </a:r>
+          </a:p>
+          <a:p>
+            <a:pPr lvl="4"/>
+            <a:r>
+              <a:rPr lang="en-US"/>
+              <a:t>Fifth level</a:t>
+            </a:r>
+            <a:endParaRPr lang="en-GB"/>
+          </a:p>
+        </p:txBody>
+      </p:sp>
+      <p:sp>
+        <p:nvSpPr>
+          <p:cNvPr id="6" name="Footer Placeholder 5"/>
+          <p:cNvSpPr>
+            <a:spLocks noGrp="1"/>
+          </p:cNvSpPr>
+          <p:nvPr>
+            <p:ph type="ftr" sz="quarter" idx="4"/>
+          </p:nvPr>
+        </p:nvSpPr>
+        <p:spPr>
+          <a:xfrm>
+            <a:off x="0" y="8685213"/>
+            <a:ext cx="2971800" cy="458787"/>
+          </a:xfrm>
+          <a:prstGeom prst="rect">
+            <a:avLst/>
+          </a:prstGeom>
+        </p:spPr>
+        <p:txBody>
+          <a:bodyPr vert="horz" lIns="91440" tIns="45720" rIns="91440" bIns="45720" rtlCol="0" anchor="b"/>
+          <a:lstStyle>
+            <a:lvl1pPr algn="l">
+              <a:defRPr sz="1200"/>
+            </a:lvl1pPr>
+          </a:lstStyle>
+          <a:p>
+            <a:endParaRPr lang="en-GB"/>
+          </a:p>
+        </p:txBody>
+      </p:sp>
+      <p:sp>
+        <p:nvSpPr>
+          <p:cNvPr id="7" name="Slide Number Placeholder 6"/>
+          <p:cNvSpPr>
+            <a:spLocks noGrp="1"/>
+          </p:cNvSpPr>
+          <p:nvPr>
+            <p:ph type="sldNum" sz="quarter" idx="5"/>
+          </p:nvPr>
+        </p:nvSpPr>
+        <p:spPr>
+          <a:xfrm>
+            <a:off x="3884613" y="8685213"/>
+            <a:ext cx="2971800" cy="458787"/>
+          </a:xfrm>
+          <a:prstGeom prst="rect">
+            <a:avLst/>
+          </a:prstGeom>
+        </p:spPr>
+        <p:txBody>
+          <a:bodyPr vert="horz" lIns="91440" tIns="45720" rIns="91440" bIns="45720" rtlCol="0" anchor="b"/>
+          <a:lstStyle>
+            <a:lvl1pPr algn="r">
+              <a:defRPr sz="1200"/>
+            </a:lvl1pPr>
+          </a:lstStyle>
+          <a:p>
+            <a:fld id="{79BD00D3-B18A-47A6-B6BD-F14745131661}" type="slidenum">
+              <a:rPr lang="en-GB" smtClean="0"/>
+              <a:t>‹#›</a:t>
+            </a:fld>
+            <a:endParaRPr lang="en-GB"/>
+          </a:p>
+        </p:txBody>
+      </p:sp>
+    </p:spTree>
+    <p:extLst>
+      <p:ext uri="{BB962C8B-B14F-4D97-AF65-F5344CB8AC3E}">
+        <p14:creationId xmlns:p14="http://schemas.microsoft.com/office/powerpoint/2010/main" val="3719824153"/>
+      </p:ext>
+    </p:extLst>
+  </p:cSld>
+  <p:clrMap bg1="lt1" tx1="dk1" bg2="lt2" tx2="dk2" accent1="accent1" accent2="accent2" accent3="accent3" accent4="accent4" accent5="accent5" accent6="accent6" hlink="hlink" folHlink="folHlink"/>
+  <p:notesStyle>
+    <a:lvl1pPr marL="0" algn="l" defTabSz="914400" rtl="0" eaLnBrk="1" latinLnBrk="0" hangingPunct="1">
+      <a:defRPr sz="1200" kern="1200">
+        <a:solidFill>
+          <a:schemeClr val="tx1"/>
+        </a:solidFill>
+        <a:latin typeface="+mn-lt"/>
+        <a:ea typeface="+mn-ea"/>
+        <a:cs typeface="+mn-cs"/>
+      </a:defRPr>
+    </a:lvl1pPr>
+    <a:lvl2pPr marL="457200" algn="l" defTabSz="914400" rtl="0" eaLnBrk="1" latinLnBrk="0" hangingPunct="1">
+      <a:defRPr sz="1200" kern="1200">
+        <a:solidFill>
+          <a:schemeClr val="tx1"/>
+        </a:solidFill>
+        <a:latin typeface="+mn-lt"/>
+        <a:ea typeface="+mn-ea"/>
+        <a:cs typeface="+mn-cs"/>
+      </a:defRPr>
+    </a:lvl2pPr>
+    <a:lvl3pPr marL="914400" algn="l" defTabSz="914400" rtl="0" eaLnBrk="1" latinLnBrk="0" hangingPunct="1">
+      <a:defRPr sz="1200" kern="1200">
+        <a:solidFill>
+          <a:schemeClr val="tx1"/>
+        </a:solidFill>
+        <a:latin typeface="+mn-lt"/>
+        <a:ea typeface="+mn-ea"/>
+        <a:cs typeface="+mn-cs"/>
+      </a:defRPr>
+    </a:lvl3pPr>
+    <a:lvl4pPr marL="1371600" algn="l" defTabSz="914400" rtl="0" eaLnBrk="1" latinLnBrk="0" hangingPunct="1">
+      <a:defRPr sz="1200" kern="1200">
+        <a:solidFill>
+          <a:schemeClr val="tx1"/>
+        </a:solidFill>
+        <a:latin typeface="+mn-lt"/>
+        <a:ea typeface="+mn-ea"/>
+        <a:cs typeface="+mn-cs"/>
+      </a:defRPr>
+    </a:lvl4pPr>
+    <a:lvl5pPr marL="1828800" algn="l" defTabSz="914400" rtl="0" eaLnBrk="1" latinLnBrk="0" hangingPunct="1">
+      <a:defRPr sz="1200" kern="1200">
+        <a:solidFill>
+          <a:schemeClr val="tx1"/>
+        </a:solidFill>
+        <a:latin typeface="+mn-lt"/>
+        <a:ea typeface="+mn-ea"/>
+        <a:cs typeface="+mn-cs"/>
+      </a:defRPr>
+    </a:lvl5pPr>
+    <a:lvl6pPr marL="2286000" algn="l" defTabSz="914400" rtl="0" eaLnBrk="1" latinLnBrk="0" hangingPunct="1">
+      <a:defRPr sz="1200" kern="1200">
+        <a:solidFill>
+          <a:schemeClr val="tx1"/>
+        </a:solidFill>
+        <a:latin typeface="+mn-lt"/>
+        <a:ea typeface="+mn-ea"/>
+        <a:cs typeface="+mn-cs"/>
+      </a:defRPr>
+    </a:lvl6pPr>
+    <a:lvl7pPr marL="2743200" algn="l" defTabSz="914400" rtl="0" eaLnBrk="1" latinLnBrk="0" hangingPunct="1">
+      <a:defRPr sz="1200" kern="1200">
+        <a:solidFill>
+          <a:schemeClr val="tx1"/>
+        </a:solidFill>
+        <a:latin typeface="+mn-lt"/>
+        <a:ea typeface="+mn-ea"/>
+        <a:cs typeface="+mn-cs"/>
+      </a:defRPr>
+    </a:lvl7pPr>
+    <a:lvl8pPr marL="3200400" algn="l" defTabSz="914400" rtl="0" eaLnBrk="1" latinLnBrk="0" hangingPunct="1">
+      <a:defRPr sz="1200" kern="1200">
+        <a:solidFill>
+          <a:schemeClr val="tx1"/>
+        </a:solidFill>
+        <a:latin typeface="+mn-lt"/>
+        <a:ea typeface="+mn-ea"/>
+        <a:cs typeface="+mn-cs"/>
+      </a:defRPr>
+    </a:lvl8pPr>
+    <a:lvl9pPr marL="3657600" algn="l" defTabSz="914400" rtl="0" eaLnBrk="1" latinLnBrk="0" hangingPunct="1">
+      <a:defRPr sz="1200" kern="1200">
+        <a:solidFill>
+          <a:schemeClr val="tx1"/>
+        </a:solidFill>
+        <a:latin typeface="+mn-lt"/>
+        <a:ea typeface="+mn-ea"/>
+        <a:cs typeface="+mn-cs"/>
+      </a:defRPr>
+    </a:lvl9pPr>
+  </p:notesStyle>
+</p:notesMaster>
+</file>
+
+<file path=ppt/notesSlides/notesSlide1.xml><?xml version="1.0" encoding="utf-8"?>
+<p:notes xmlns:a="http://schemas.openxmlformats.org/drawingml/2006/main" xmlns:r="http://schemas.openxmlformats.org/officeDocument/2006/relationships" xmlns:p="http://schemas.openxmlformats.org/presentationml/2006/main">
+  <p:cSld>
+    <p:spTree>
+      <p:nvGrpSpPr>
+        <p:cNvPr id="1" name=""/>
+        <p:cNvGrpSpPr/>
+        <p:nvPr/>
+      </p:nvGrpSpPr>
+      <p:grpSpPr>
+        <a:xfrm>
+          <a:off x="0" y="0"/>
+          <a:ext cx="0" cy="0"/>
+          <a:chOff x="0" y="0"/>
+          <a:chExt cx="0" cy="0"/>
+        </a:xfrm>
+      </p:grpSpPr>
+      <p:sp>
+        <p:nvSpPr>
+          <p:cNvPr id="2" name="Slide Image Placeholder 1"/>
+          <p:cNvSpPr>
+            <a:spLocks noGrp="1" noRot="1" noChangeAspect="1"/>
+          </p:cNvSpPr>
+          <p:nvPr>
+            <p:ph type="sldImg"/>
+          </p:nvPr>
+        </p:nvSpPr>
+        <p:spPr/>
+      </p:sp>
+      <p:sp>
+        <p:nvSpPr>
+          <p:cNvPr id="3" name="Notes Placeholder 2"/>
+          <p:cNvSpPr>
+            <a:spLocks noGrp="1"/>
+          </p:cNvSpPr>
+          <p:nvPr>
+            <p:ph type="body" idx="1"/>
+          </p:nvPr>
+        </p:nvSpPr>
+        <p:spPr/>
+        <p:txBody>
+          <a:bodyPr/>
+          <a:lstStyle/>
+          <a:p>
+            <a:r>
+              <a:rPr lang="en-GB" dirty="0"/>
+              <a:t>My project is about building a system that will allow for the combined acquisition and analysis of real-time data from EEG, EMG and eye-tracking devices. Using said system, behaviours and interactions with a game world will be explored, with the two examples being avatar skeletal rig control and game difficulty scaling.</a:t>
+            </a:r>
+          </a:p>
+        </p:txBody>
+      </p:sp>
+      <p:sp>
+        <p:nvSpPr>
+          <p:cNvPr id="4" name="Slide Number Placeholder 3"/>
+          <p:cNvSpPr>
+            <a:spLocks noGrp="1"/>
+          </p:cNvSpPr>
+          <p:nvPr>
+            <p:ph type="sldNum" sz="quarter" idx="5"/>
+          </p:nvPr>
+        </p:nvSpPr>
+        <p:spPr/>
+        <p:txBody>
+          <a:bodyPr/>
+          <a:lstStyle/>
+          <a:p>
+            <a:fld id="{79BD00D3-B18A-47A6-B6BD-F14745131661}" type="slidenum">
+              <a:rPr lang="en-GB" smtClean="0"/>
+              <a:t>1</a:t>
+            </a:fld>
+            <a:endParaRPr lang="en-GB"/>
+          </a:p>
+        </p:txBody>
+      </p:sp>
+    </p:spTree>
+    <p:extLst>
+      <p:ext uri="{BB962C8B-B14F-4D97-AF65-F5344CB8AC3E}">
+        <p14:creationId xmlns:p14="http://schemas.microsoft.com/office/powerpoint/2010/main" val="1420853951"/>
+      </p:ext>
+    </p:extLst>
+  </p:cSld>
+  <p:clrMapOvr>
+    <a:masterClrMapping/>
+  </p:clrMapOvr>
+</p:notes>
+</file>
+
+<file path=ppt/notesSlides/notesSlide2.xml><?xml version="1.0" encoding="utf-8"?>
+<p:notes xmlns:a="http://schemas.openxmlformats.org/drawingml/2006/main" xmlns:r="http://schemas.openxmlformats.org/officeDocument/2006/relationships" xmlns:p="http://schemas.openxmlformats.org/presentationml/2006/main">
+  <p:cSld>
+    <p:spTree>
+      <p:nvGrpSpPr>
+        <p:cNvPr id="1" name=""/>
+        <p:cNvGrpSpPr/>
+        <p:nvPr/>
+      </p:nvGrpSpPr>
+      <p:grpSpPr>
+        <a:xfrm>
+          <a:off x="0" y="0"/>
+          <a:ext cx="0" cy="0"/>
+          <a:chOff x="0" y="0"/>
+          <a:chExt cx="0" cy="0"/>
+        </a:xfrm>
+      </p:grpSpPr>
+      <p:sp>
+        <p:nvSpPr>
+          <p:cNvPr id="2" name="Slide Image Placeholder 1"/>
+          <p:cNvSpPr>
+            <a:spLocks noGrp="1" noRot="1" noChangeAspect="1"/>
+          </p:cNvSpPr>
+          <p:nvPr>
+            <p:ph type="sldImg"/>
+          </p:nvPr>
+        </p:nvSpPr>
+        <p:spPr/>
+      </p:sp>
+      <p:sp>
+        <p:nvSpPr>
+          <p:cNvPr id="3" name="Notes Placeholder 2"/>
+          <p:cNvSpPr>
+            <a:spLocks noGrp="1"/>
+          </p:cNvSpPr>
+          <p:nvPr>
+            <p:ph type="body" idx="1"/>
+          </p:nvPr>
+        </p:nvSpPr>
+        <p:spPr/>
+        <p:txBody>
+          <a:bodyPr/>
+          <a:lstStyle/>
+          <a:p>
+            <a:r>
+              <a:rPr lang="en-GB" dirty="0"/>
+              <a:t>There are three main examples of similar system having previously been developed that I would like to mention, prosthetic arm thing</a:t>
+            </a:r>
+          </a:p>
+          <a:p>
+            <a:r>
+              <a:rPr lang="en-GB" dirty="0"/>
+              <a:t> - Wheel chair</a:t>
+            </a:r>
+          </a:p>
+          <a:p>
+            <a:endParaRPr lang="en-GB" dirty="0"/>
+          </a:p>
+        </p:txBody>
+      </p:sp>
+      <p:sp>
+        <p:nvSpPr>
+          <p:cNvPr id="4" name="Slide Number Placeholder 3"/>
+          <p:cNvSpPr>
+            <a:spLocks noGrp="1"/>
+          </p:cNvSpPr>
+          <p:nvPr>
+            <p:ph type="sldNum" sz="quarter" idx="5"/>
+          </p:nvPr>
+        </p:nvSpPr>
+        <p:spPr/>
+        <p:txBody>
+          <a:bodyPr/>
+          <a:lstStyle/>
+          <a:p>
+            <a:fld id="{79BD00D3-B18A-47A6-B6BD-F14745131661}" type="slidenum">
+              <a:rPr lang="en-GB" smtClean="0"/>
+              <a:t>2</a:t>
+            </a:fld>
+            <a:endParaRPr lang="en-GB"/>
+          </a:p>
+        </p:txBody>
+      </p:sp>
+    </p:spTree>
+    <p:extLst>
+      <p:ext uri="{BB962C8B-B14F-4D97-AF65-F5344CB8AC3E}">
+        <p14:creationId xmlns:p14="http://schemas.microsoft.com/office/powerpoint/2010/main" val="240505622"/>
+      </p:ext>
+    </p:extLst>
+  </p:cSld>
+  <p:clrMapOvr>
+    <a:masterClrMapping/>
+  </p:clrMapOvr>
+</p:notes>
+</file>
+
+<file path=ppt/notesSlides/notesSlide3.xml><?xml version="1.0" encoding="utf-8"?>
+<p:notes xmlns:a="http://schemas.openxmlformats.org/drawingml/2006/main" xmlns:r="http://schemas.openxmlformats.org/officeDocument/2006/relationships" xmlns:p="http://schemas.openxmlformats.org/presentationml/2006/main">
+  <p:cSld>
+    <p:spTree>
+      <p:nvGrpSpPr>
+        <p:cNvPr id="1" name=""/>
+        <p:cNvGrpSpPr/>
+        <p:nvPr/>
+      </p:nvGrpSpPr>
+      <p:grpSpPr>
+        <a:xfrm>
+          <a:off x="0" y="0"/>
+          <a:ext cx="0" cy="0"/>
+          <a:chOff x="0" y="0"/>
+          <a:chExt cx="0" cy="0"/>
+        </a:xfrm>
+      </p:grpSpPr>
+      <p:sp>
+        <p:nvSpPr>
+          <p:cNvPr id="2" name="Slide Image Placeholder 1"/>
+          <p:cNvSpPr>
+            <a:spLocks noGrp="1" noRot="1" noChangeAspect="1"/>
+          </p:cNvSpPr>
+          <p:nvPr>
+            <p:ph type="sldImg"/>
+          </p:nvPr>
+        </p:nvSpPr>
+        <p:spPr/>
+      </p:sp>
+      <p:sp>
+        <p:nvSpPr>
+          <p:cNvPr id="3" name="Notes Placeholder 2"/>
+          <p:cNvSpPr>
+            <a:spLocks noGrp="1"/>
+          </p:cNvSpPr>
+          <p:nvPr>
+            <p:ph type="body" idx="1"/>
+          </p:nvPr>
+        </p:nvSpPr>
+        <p:spPr/>
+        <p:txBody>
+          <a:bodyPr/>
+          <a:lstStyle/>
+          <a:p>
+            <a:r>
+              <a:rPr lang="en-GB" dirty="0"/>
+              <a:t>All </a:t>
+            </a:r>
+            <a:r>
+              <a:rPr lang="en-GB" dirty="0" err="1"/>
+              <a:t>secion</a:t>
+            </a:r>
+            <a:endParaRPr lang="en-GB" dirty="0"/>
+          </a:p>
+        </p:txBody>
+      </p:sp>
+      <p:sp>
+        <p:nvSpPr>
+          <p:cNvPr id="4" name="Slide Number Placeholder 3"/>
+          <p:cNvSpPr>
+            <a:spLocks noGrp="1"/>
+          </p:cNvSpPr>
+          <p:nvPr>
+            <p:ph type="sldNum" sz="quarter" idx="5"/>
+          </p:nvPr>
+        </p:nvSpPr>
+        <p:spPr/>
+        <p:txBody>
+          <a:bodyPr/>
+          <a:lstStyle/>
+          <a:p>
+            <a:fld id="{79BD00D3-B18A-47A6-B6BD-F14745131661}" type="slidenum">
+              <a:rPr lang="en-GB" smtClean="0"/>
+              <a:t>3</a:t>
+            </a:fld>
+            <a:endParaRPr lang="en-GB"/>
+          </a:p>
+        </p:txBody>
+      </p:sp>
+    </p:spTree>
+    <p:extLst>
+      <p:ext uri="{BB962C8B-B14F-4D97-AF65-F5344CB8AC3E}">
+        <p14:creationId xmlns:p14="http://schemas.microsoft.com/office/powerpoint/2010/main" val="1618196836"/>
+      </p:ext>
+    </p:extLst>
+  </p:cSld>
+  <p:clrMapOvr>
+    <a:masterClrMapping/>
+  </p:clrMapOvr>
+</p:notes>
 </file>
 
 <file path=ppt/slideLayouts/slideLayout1.xml><?xml version="1.0" encoding="utf-8"?>
@@ -264,7 +897,7 @@
           <a:p>
             <a:fld id="{0CB9B650-73E2-4D86-BE0A-DE5F98986D4B}" type="datetimeFigureOut">
               <a:rPr lang="en-GB" smtClean="0"/>
-              <a:t>17/03/2022</a:t>
+              <a:t>19/03/2022</a:t>
             </a:fld>
             <a:endParaRPr lang="en-GB"/>
           </a:p>
@@ -464,7 +1097,7 @@
           <a:p>
             <a:fld id="{0CB9B650-73E2-4D86-BE0A-DE5F98986D4B}" type="datetimeFigureOut">
               <a:rPr lang="en-GB" smtClean="0"/>
-              <a:t>17/03/2022</a:t>
+              <a:t>19/03/2022</a:t>
             </a:fld>
             <a:endParaRPr lang="en-GB"/>
           </a:p>
@@ -674,7 +1307,7 @@
           <a:p>
             <a:fld id="{0CB9B650-73E2-4D86-BE0A-DE5F98986D4B}" type="datetimeFigureOut">
               <a:rPr lang="en-GB" smtClean="0"/>
-              <a:t>17/03/2022</a:t>
+              <a:t>19/03/2022</a:t>
             </a:fld>
             <a:endParaRPr lang="en-GB"/>
           </a:p>
@@ -874,7 +1507,7 @@
           <a:p>
             <a:fld id="{0CB9B650-73E2-4D86-BE0A-DE5F98986D4B}" type="datetimeFigureOut">
               <a:rPr lang="en-GB" smtClean="0"/>
-              <a:t>17/03/2022</a:t>
+              <a:t>19/03/2022</a:t>
             </a:fld>
             <a:endParaRPr lang="en-GB"/>
           </a:p>
@@ -1150,7 +1783,7 @@
           <a:p>
             <a:fld id="{0CB9B650-73E2-4D86-BE0A-DE5F98986D4B}" type="datetimeFigureOut">
               <a:rPr lang="en-GB" smtClean="0"/>
-              <a:t>17/03/2022</a:t>
+              <a:t>19/03/2022</a:t>
             </a:fld>
             <a:endParaRPr lang="en-GB"/>
           </a:p>
@@ -1418,7 +2051,7 @@
           <a:p>
             <a:fld id="{0CB9B650-73E2-4D86-BE0A-DE5F98986D4B}" type="datetimeFigureOut">
               <a:rPr lang="en-GB" smtClean="0"/>
-              <a:t>17/03/2022</a:t>
+              <a:t>19/03/2022</a:t>
             </a:fld>
             <a:endParaRPr lang="en-GB"/>
           </a:p>
@@ -1833,7 +2466,7 @@
           <a:p>
             <a:fld id="{0CB9B650-73E2-4D86-BE0A-DE5F98986D4B}" type="datetimeFigureOut">
               <a:rPr lang="en-GB" smtClean="0"/>
-              <a:t>17/03/2022</a:t>
+              <a:t>19/03/2022</a:t>
             </a:fld>
             <a:endParaRPr lang="en-GB"/>
           </a:p>
@@ -1975,7 +2608,7 @@
           <a:p>
             <a:fld id="{0CB9B650-73E2-4D86-BE0A-DE5F98986D4B}" type="datetimeFigureOut">
               <a:rPr lang="en-GB" smtClean="0"/>
-              <a:t>17/03/2022</a:t>
+              <a:t>19/03/2022</a:t>
             </a:fld>
             <a:endParaRPr lang="en-GB"/>
           </a:p>
@@ -2088,7 +2721,7 @@
           <a:p>
             <a:fld id="{0CB9B650-73E2-4D86-BE0A-DE5F98986D4B}" type="datetimeFigureOut">
               <a:rPr lang="en-GB" smtClean="0"/>
-              <a:t>17/03/2022</a:t>
+              <a:t>19/03/2022</a:t>
             </a:fld>
             <a:endParaRPr lang="en-GB"/>
           </a:p>
@@ -2401,7 +3034,7 @@
           <a:p>
             <a:fld id="{0CB9B650-73E2-4D86-BE0A-DE5F98986D4B}" type="datetimeFigureOut">
               <a:rPr lang="en-GB" smtClean="0"/>
-              <a:t>17/03/2022</a:t>
+              <a:t>19/03/2022</a:t>
             </a:fld>
             <a:endParaRPr lang="en-GB"/>
           </a:p>
@@ -2690,7 +3323,7 @@
           <a:p>
             <a:fld id="{0CB9B650-73E2-4D86-BE0A-DE5F98986D4B}" type="datetimeFigureOut">
               <a:rPr lang="en-GB" smtClean="0"/>
-              <a:t>17/03/2022</a:t>
+              <a:t>19/03/2022</a:t>
             </a:fld>
             <a:endParaRPr lang="en-GB"/>
           </a:p>
@@ -2933,7 +3566,7 @@
           <a:p>
             <a:fld id="{0CB9B650-73E2-4D86-BE0A-DE5F98986D4B}" type="datetimeFigureOut">
               <a:rPr lang="en-GB" smtClean="0"/>
-              <a:t>17/03/2022</a:t>
+              <a:t>19/03/2022</a:t>
             </a:fld>
             <a:endParaRPr lang="en-GB"/>
           </a:p>
@@ -3365,7 +3998,7 @@
           <p:nvPr/>
         </p:nvPicPr>
         <p:blipFill rotWithShape="1">
-          <a:blip r:embed="rId2">
+          <a:blip r:embed="rId3">
             <a:duotone>
               <a:prstClr val="black"/>
               <a:schemeClr val="accent1">
@@ -3385,6 +4018,19 @@
           <a:prstGeom prst="rect">
             <a:avLst/>
           </a:prstGeom>
+          <a:ln w="127000" cap="sq">
+            <a:solidFill>
+              <a:srgbClr val="000000"/>
+            </a:solidFill>
+            <a:miter lim="800000"/>
+          </a:ln>
+          <a:effectLst>
+            <a:innerShdw blurRad="63500" dist="50800" dir="18900000">
+              <a:prstClr val="black">
+                <a:alpha val="50000"/>
+              </a:prstClr>
+            </a:innerShdw>
+          </a:effectLst>
         </p:spPr>
       </p:pic>
       <p:sp>
@@ -3403,8 +4049,8 @@
         </p:nvSpPr>
         <p:spPr>
           <a:xfrm>
-            <a:off x="355411" y="330882"/>
-            <a:ext cx="8313576" cy="3098117"/>
+            <a:off x="726885" y="473757"/>
+            <a:ext cx="8895269" cy="3098117"/>
           </a:xfrm>
           <a:prstGeom prst="rect">
             <a:avLst/>
@@ -3456,23 +4102,32 @@
             </a:r>
           </a:p>
           <a:p>
-            <a:pPr marL="457200" indent="-457200" algn="l">
+            <a:pPr algn="l">
               <a:lnSpc>
                 <a:spcPct val="107000"/>
               </a:lnSpc>
               <a:spcAft>
                 <a:spcPts val="800"/>
               </a:spcAft>
-              <a:buFont typeface="Wingdings" panose="05000000000000000000" pitchFamily="2" charset="2"/>
-              <a:buChar char="§"/>
             </a:pPr>
             <a:r>
-              <a:rPr lang="en-GB" sz="3200" dirty="0">
+              <a:rPr lang="en-GB" sz="2400" dirty="0">
                 <a:solidFill>
                   <a:schemeClr val="bg1"/>
                 </a:solidFill>
+                <a:latin typeface="Bahnschrift Light Condensed" panose="020B0502040204020203" pitchFamily="34" charset="0"/>
+                <a:ea typeface="Calibri" panose="020F0502020204030204" pitchFamily="34" charset="0"/>
+                <a:cs typeface="Times New Roman" panose="02020603050405020304" pitchFamily="18" charset="0"/>
+              </a:rPr>
+              <a:t>        </a:t>
+            </a:r>
+            <a:r>
+              <a:rPr lang="en-GB" sz="2400" dirty="0">
+                <a:solidFill>
+                  <a:schemeClr val="bg1"/>
+                </a:solidFill>
                 <a:effectLst/>
-                <a:latin typeface="Agency FB" panose="020B0503020202020204" pitchFamily="34" charset="0"/>
+                <a:latin typeface="Bahnschrift Light Condensed" panose="020B0502040204020203" pitchFamily="34" charset="0"/>
                 <a:ea typeface="Calibri" panose="020F0502020204030204" pitchFamily="34" charset="0"/>
                 <a:cs typeface="Times New Roman" panose="02020603050405020304" pitchFamily="18" charset="0"/>
               </a:rPr>
@@ -3513,10 +4168,10 @@
       </p:grpSpPr>
       <p:pic>
         <p:nvPicPr>
-          <p:cNvPr id="6" name="Picture 2">
-            <a:extLst>
-              <a:ext uri="{FF2B5EF4-FFF2-40B4-BE49-F238E27FC236}">
-                <a16:creationId xmlns:a16="http://schemas.microsoft.com/office/drawing/2014/main" id="{C750F59D-7D99-4171-9C70-7F2B3106D5FE}"/>
+          <p:cNvPr id="8" name="Picture 2">
+            <a:extLst>
+              <a:ext uri="{FF2B5EF4-FFF2-40B4-BE49-F238E27FC236}">
+                <a16:creationId xmlns:a16="http://schemas.microsoft.com/office/drawing/2014/main" id="{551977C0-BB0B-482E-AB84-2366B915016E}"/>
               </a:ext>
             </a:extLst>
           </p:cNvPr>
@@ -3526,7 +4181,7 @@
           <p:nvPr/>
         </p:nvPicPr>
         <p:blipFill rotWithShape="1">
-          <a:blip r:embed="rId2">
+          <a:blip r:embed="rId3">
             <a:duotone>
               <a:prstClr val="black"/>
               <a:schemeClr val="accent1">
@@ -3540,20 +4195,157 @@
         </p:blipFill>
         <p:spPr>
           <a:xfrm>
-            <a:off x="20" y="10"/>
+            <a:off x="0" y="10"/>
             <a:ext cx="12191980" cy="6857990"/>
           </a:xfrm>
           <a:prstGeom prst="rect">
             <a:avLst/>
           </a:prstGeom>
+          <a:ln w="127000" cap="sq">
+            <a:solidFill>
+              <a:srgbClr val="000000"/>
+            </a:solidFill>
+            <a:miter lim="800000"/>
+          </a:ln>
+          <a:effectLst>
+            <a:innerShdw blurRad="63500" dist="50800" dir="18900000">
+              <a:prstClr val="black">
+                <a:alpha val="50000"/>
+              </a:prstClr>
+            </a:innerShdw>
+          </a:effectLst>
         </p:spPr>
       </p:pic>
       <p:sp>
         <p:nvSpPr>
-          <p:cNvPr id="7" name="Title 1">
-            <a:extLst>
-              <a:ext uri="{FF2B5EF4-FFF2-40B4-BE49-F238E27FC236}">
-                <a16:creationId xmlns:a16="http://schemas.microsoft.com/office/drawing/2014/main" id="{37DC246B-15A1-4ECD-B936-5B3331447342}"/>
+          <p:cNvPr id="20" name="Rectangle 19">
+            <a:extLst>
+              <a:ext uri="{FF2B5EF4-FFF2-40B4-BE49-F238E27FC236}">
+                <a16:creationId xmlns:a16="http://schemas.microsoft.com/office/drawing/2014/main" id="{999597AB-97FA-4798-AED0-82667BC1C853}"/>
+              </a:ext>
+            </a:extLst>
+          </p:cNvPr>
+          <p:cNvSpPr/>
+          <p:nvPr/>
+        </p:nvSpPr>
+        <p:spPr>
+          <a:xfrm>
+            <a:off x="1508579" y="1764261"/>
+            <a:ext cx="263122" cy="4133647"/>
+          </a:xfrm>
+          <a:prstGeom prst="rect">
+            <a:avLst/>
+          </a:prstGeom>
+          <a:solidFill>
+            <a:schemeClr val="tx2">
+              <a:lumMod val="50000"/>
+            </a:schemeClr>
+          </a:solidFill>
+          <a:ln w="38100">
+            <a:solidFill>
+              <a:schemeClr val="tx1"/>
+            </a:solidFill>
+          </a:ln>
+          <a:effectLst>
+            <a:innerShdw blurRad="114300">
+              <a:prstClr val="black"/>
+            </a:innerShdw>
+          </a:effectLst>
+        </p:spPr>
+        <p:style>
+          <a:lnRef idx="2">
+            <a:schemeClr val="accent1">
+              <a:shade val="50000"/>
+            </a:schemeClr>
+          </a:lnRef>
+          <a:fillRef idx="1">
+            <a:schemeClr val="accent1"/>
+          </a:fillRef>
+          <a:effectRef idx="0">
+            <a:schemeClr val="accent1"/>
+          </a:effectRef>
+          <a:fontRef idx="minor">
+            <a:schemeClr val="lt1"/>
+          </a:fontRef>
+        </p:style>
+        <p:txBody>
+          <a:bodyPr rtlCol="0" anchor="ctr"/>
+          <a:lstStyle/>
+          <a:p>
+            <a:pPr algn="ctr"/>
+            <a:endParaRPr lang="en-GB"/>
+          </a:p>
+        </p:txBody>
+      </p:sp>
+      <p:sp>
+        <p:nvSpPr>
+          <p:cNvPr id="2" name="TextBox 1">
+            <a:extLst>
+              <a:ext uri="{FF2B5EF4-FFF2-40B4-BE49-F238E27FC236}">
+                <a16:creationId xmlns:a16="http://schemas.microsoft.com/office/drawing/2014/main" id="{1EF1F9DB-50BA-405C-AA9B-044F8E13E48E}"/>
+              </a:ext>
+            </a:extLst>
+          </p:cNvPr>
+          <p:cNvSpPr txBox="1"/>
+          <p:nvPr/>
+        </p:nvSpPr>
+        <p:spPr>
+          <a:xfrm>
+            <a:off x="3280280" y="959884"/>
+            <a:ext cx="8523100" cy="1446550"/>
+          </a:xfrm>
+          <a:prstGeom prst="rect">
+            <a:avLst/>
+          </a:prstGeom>
+          <a:noFill/>
+        </p:spPr>
+        <p:txBody>
+          <a:bodyPr wrap="square" rtlCol="0">
+            <a:spAutoFit/>
+          </a:bodyPr>
+          <a:lstStyle/>
+          <a:p>
+            <a:r>
+              <a:rPr lang="en-GB" u="sng" dirty="0">
+                <a:solidFill>
+                  <a:schemeClr val="bg1"/>
+                </a:solidFill>
+                <a:effectLst/>
+                <a:latin typeface="Bahnschrift Light Condensed" panose="020B0502040204020203" pitchFamily="34" charset="0"/>
+              </a:rPr>
+              <a:t>Brain-controlled wheelchairs: a robotic architecture</a:t>
+            </a:r>
+            <a:r>
+              <a:rPr lang="en-GB" dirty="0">
+                <a:solidFill>
+                  <a:schemeClr val="bg1"/>
+                </a:solidFill>
+                <a:effectLst/>
+                <a:latin typeface="Bahnschrift Light Condensed" panose="020B0502040204020203" pitchFamily="34" charset="0"/>
+              </a:rPr>
+              <a:t> [ 6 ]</a:t>
+            </a:r>
+          </a:p>
+          <a:p>
+            <a:pPr lvl="1"/>
+            <a:r>
+              <a:rPr lang="en-GB" sz="1400" dirty="0">
+                <a:solidFill>
+                  <a:schemeClr val="bg1"/>
+                </a:solidFill>
+                <a:latin typeface="Bahnschrift Light Condensed" panose="020B0502040204020203" pitchFamily="34" charset="0"/>
+              </a:rPr>
+              <a:t>The authors of the paper used a 16 electrode EEG headset to capture motor imagery data, feeding these signals, along side the results of a computer vision network, into a multi-modal input and analysis system they where able to allow for the real time control of a wheel chair for motor impaired person. Allowing for the disregarding of ERP’s, and the constant stopping to verify user inputs, the system used path finding, and obstacle avoidance to infer meaning from where the user wanted to go rather then the typical left and right responses seen in motor imagery work.</a:t>
+            </a:r>
+          </a:p>
+        </p:txBody>
+      </p:sp>
+      <p:sp>
+        <p:nvSpPr>
+          <p:cNvPr id="10" name="Title 1">
+            <a:extLst>
+              <a:ext uri="{FF2B5EF4-FFF2-40B4-BE49-F238E27FC236}">
+                <a16:creationId xmlns:a16="http://schemas.microsoft.com/office/drawing/2014/main" id="{4443F0EA-09DB-42E5-9EF3-A3A76D3510AC}"/>
               </a:ext>
             </a:extLst>
           </p:cNvPr>
@@ -3564,15 +4356,15 @@
         </p:nvSpPr>
         <p:spPr>
           <a:xfrm>
-            <a:off x="2445469" y="1819224"/>
-            <a:ext cx="7301061" cy="3219551"/>
+            <a:off x="176173" y="165275"/>
+            <a:ext cx="7301061" cy="584049"/>
           </a:xfrm>
           <a:prstGeom prst="rect">
             <a:avLst/>
           </a:prstGeom>
         </p:spPr>
         <p:txBody>
-          <a:bodyPr vert="horz" lIns="91440" tIns="45720" rIns="91440" bIns="45720" rtlCol="0" anchor="ctr">
+          <a:bodyPr vert="horz" lIns="91440" tIns="45720" rIns="91440" bIns="45720" rtlCol="0" anchor="t">
             <a:noAutofit/>
           </a:bodyPr>
           <a:lstStyle>
@@ -3595,6 +4387,7 @@
             </a:lvl1pPr>
           </a:lstStyle>
           <a:p>
+            <a:pPr algn="l"/>
             <a:r>
               <a:rPr lang="en-GB" sz="3200" b="1" dirty="0">
                 <a:solidFill>
@@ -3602,17 +4395,17 @@
                 </a:solidFill>
                 <a:latin typeface="Agency FB" panose="020B0503020202020204" pitchFamily="34" charset="0"/>
               </a:rPr>
-              <a:t>Literature</a:t>
-            </a:r>
-          </a:p>
-        </p:txBody>
-      </p:sp>
-      <p:sp>
-        <p:nvSpPr>
-          <p:cNvPr id="2" name="TextBox 1">
-            <a:extLst>
-              <a:ext uri="{FF2B5EF4-FFF2-40B4-BE49-F238E27FC236}">
-                <a16:creationId xmlns:a16="http://schemas.microsoft.com/office/drawing/2014/main" id="{1EF1F9DB-50BA-405C-AA9B-044F8E13E48E}"/>
+              <a:t>Literature Review: Key Studies</a:t>
+            </a:r>
+          </a:p>
+        </p:txBody>
+      </p:sp>
+      <p:sp>
+        <p:nvSpPr>
+          <p:cNvPr id="12" name="TextBox 11">
+            <a:extLst>
+              <a:ext uri="{FF2B5EF4-FFF2-40B4-BE49-F238E27FC236}">
+                <a16:creationId xmlns:a16="http://schemas.microsoft.com/office/drawing/2014/main" id="{5960476E-4C83-426D-9207-534D94B0799D}"/>
               </a:ext>
             </a:extLst>
           </p:cNvPr>
@@ -3621,8 +4414,8 @@
         </p:nvSpPr>
         <p:spPr>
           <a:xfrm>
-            <a:off x="184067" y="172192"/>
-            <a:ext cx="8736174" cy="738664"/>
+            <a:off x="3280281" y="2962787"/>
+            <a:ext cx="8525725" cy="1508105"/>
           </a:xfrm>
           <a:prstGeom prst="rect">
             <a:avLst/>
@@ -3630,36 +4423,286 @@
           <a:noFill/>
         </p:spPr>
         <p:txBody>
-          <a:bodyPr wrap="none" rtlCol="0">
+          <a:bodyPr wrap="square" rtlCol="0">
             <a:spAutoFit/>
           </a:bodyPr>
           <a:lstStyle/>
           <a:p>
             <a:r>
-              <a:rPr lang="en-GB" sz="2400" dirty="0">
+              <a:rPr lang="en-GB" u="sng" dirty="0">
                 <a:solidFill>
                   <a:schemeClr val="bg1"/>
                 </a:solidFill>
+                <a:effectLst/>
+                <a:latin typeface="Bahnschrift Light Condensed" panose="020B0502040204020203" pitchFamily="34" charset="0"/>
               </a:rPr>
-              <a:t>Examples of Using EEG / Multi-Modal input systems to perform tasks</a:t>
-            </a:r>
-          </a:p>
-          <a:p>
-            <a:pPr marL="285750" indent="-285750">
-              <a:buFont typeface="Arial" panose="020B0604020202020204" pitchFamily="34" charset="0"/>
-              <a:buChar char="•"/>
-            </a:pPr>
+              <a:t>Demonstration of a semi-autonomous hybrid brain--machine interface using human intracranial EEG, eye tracking, and computer vision to control a robotic upper limb prosthetic</a:t>
+            </a:r>
             <a:r>
               <a:rPr lang="en-GB" dirty="0">
                 <a:solidFill>
                   <a:schemeClr val="bg1"/>
                 </a:solidFill>
+                <a:effectLst/>
+                <a:latin typeface="Bahnschrift Light Condensed" panose="020B0502040204020203" pitchFamily="34" charset="0"/>
               </a:rPr>
-              <a:t>Brain-Controlled Wheelchairs: A Robotic Architecture</a:t>
-            </a:r>
-          </a:p>
-        </p:txBody>
-      </p:sp>
+              <a:t> [ 14 ]</a:t>
+            </a:r>
+            <a:endParaRPr lang="en-GB" u="sng" dirty="0">
+              <a:solidFill>
+                <a:schemeClr val="bg1"/>
+              </a:solidFill>
+              <a:effectLst/>
+              <a:latin typeface="Bahnschrift Light Condensed" panose="020B0502040204020203" pitchFamily="34" charset="0"/>
+            </a:endParaRPr>
+          </a:p>
+          <a:p>
+            <a:pPr lvl="1"/>
+            <a:r>
+              <a:rPr lang="en-GB" sz="1400" dirty="0">
+                <a:solidFill>
+                  <a:schemeClr val="bg1"/>
+                </a:solidFill>
+                <a:latin typeface="Bahnschrift Light Condensed" panose="020B0502040204020203" pitchFamily="34" charset="0"/>
+              </a:rPr>
+              <a:t>Using computer vision, eye tracking and motor imagery based EEG the authors of the study where able to get a prosthetic arm to pickup objects when the user tried to do so. This showed reasonably accuracy with both when the arm activated and for what object it reached. This was made more accurate by removing the direct control from the user, and leaving much of the more difficult manoeuvring of the arm to IK models.</a:t>
+            </a:r>
+          </a:p>
+        </p:txBody>
+      </p:sp>
+      <p:sp>
+        <p:nvSpPr>
+          <p:cNvPr id="13" name="TextBox 12">
+            <a:extLst>
+              <a:ext uri="{FF2B5EF4-FFF2-40B4-BE49-F238E27FC236}">
+                <a16:creationId xmlns:a16="http://schemas.microsoft.com/office/drawing/2014/main" id="{C1E55EF7-9F0C-4564-BC7A-BD4D64BB3E3C}"/>
+              </a:ext>
+            </a:extLst>
+          </p:cNvPr>
+          <p:cNvSpPr txBox="1"/>
+          <p:nvPr/>
+        </p:nvSpPr>
+        <p:spPr>
+          <a:xfrm>
+            <a:off x="3280280" y="4965690"/>
+            <a:ext cx="8523100" cy="369332"/>
+          </a:xfrm>
+          <a:prstGeom prst="rect">
+            <a:avLst/>
+          </a:prstGeom>
+          <a:noFill/>
+        </p:spPr>
+        <p:txBody>
+          <a:bodyPr wrap="square" rtlCol="0">
+            <a:spAutoFit/>
+          </a:bodyPr>
+          <a:lstStyle/>
+          <a:p>
+            <a:r>
+              <a:rPr lang="en-GB" dirty="0">
+                <a:solidFill>
+                  <a:schemeClr val="bg1"/>
+                </a:solidFill>
+                <a:effectLst/>
+                <a:latin typeface="Bahnschrift Light Condensed" panose="020B0502040204020203" pitchFamily="34" charset="0"/>
+              </a:rPr>
+              <a:t>Brain-controlled wheelchairs: a robotic architecture</a:t>
+            </a:r>
+            <a:endParaRPr lang="en-GB" dirty="0">
+              <a:solidFill>
+                <a:schemeClr val="bg1"/>
+              </a:solidFill>
+              <a:latin typeface="Bahnschrift Light Condensed" panose="020B0502040204020203" pitchFamily="34" charset="0"/>
+            </a:endParaRPr>
+          </a:p>
+        </p:txBody>
+      </p:sp>
+      <p:sp>
+        <p:nvSpPr>
+          <p:cNvPr id="15" name="Rectangle 14">
+            <a:extLst>
+              <a:ext uri="{FF2B5EF4-FFF2-40B4-BE49-F238E27FC236}">
+                <a16:creationId xmlns:a16="http://schemas.microsoft.com/office/drawing/2014/main" id="{50CF1DA9-4563-42A8-A2AA-319DA17D6E43}"/>
+              </a:ext>
+            </a:extLst>
+          </p:cNvPr>
+          <p:cNvSpPr/>
+          <p:nvPr/>
+        </p:nvSpPr>
+        <p:spPr>
+          <a:xfrm>
+            <a:off x="385994" y="4965690"/>
+            <a:ext cx="2508293" cy="1793282"/>
+          </a:xfrm>
+          <a:prstGeom prst="rect">
+            <a:avLst/>
+          </a:prstGeom>
+          <a:solidFill>
+            <a:schemeClr val="tx1">
+              <a:lumMod val="65000"/>
+              <a:lumOff val="35000"/>
+            </a:schemeClr>
+          </a:solidFill>
+          <a:ln>
+            <a:solidFill>
+              <a:schemeClr val="tx1"/>
+            </a:solidFill>
+          </a:ln>
+          <a:effectLst>
+            <a:innerShdw blurRad="419100">
+              <a:prstClr val="black"/>
+            </a:innerShdw>
+          </a:effectLst>
+        </p:spPr>
+        <p:style>
+          <a:lnRef idx="2">
+            <a:schemeClr val="accent5">
+              <a:shade val="50000"/>
+            </a:schemeClr>
+          </a:lnRef>
+          <a:fillRef idx="1">
+            <a:schemeClr val="accent5"/>
+          </a:fillRef>
+          <a:effectRef idx="0">
+            <a:schemeClr val="accent5"/>
+          </a:effectRef>
+          <a:fontRef idx="minor">
+            <a:schemeClr val="lt1"/>
+          </a:fontRef>
+        </p:style>
+        <p:txBody>
+          <a:bodyPr rtlCol="0" anchor="ctr"/>
+          <a:lstStyle/>
+          <a:p>
+            <a:pPr algn="ctr"/>
+            <a:endParaRPr lang="en-GB"/>
+          </a:p>
+        </p:txBody>
+      </p:sp>
+      <p:pic>
+        <p:nvPicPr>
+          <p:cNvPr id="17" name="Picture 16">
+            <a:extLst>
+              <a:ext uri="{FF2B5EF4-FFF2-40B4-BE49-F238E27FC236}">
+                <a16:creationId xmlns:a16="http://schemas.microsoft.com/office/drawing/2014/main" id="{7A554CBA-3BFB-406F-85A9-37DDEF7A5C67}"/>
+              </a:ext>
+            </a:extLst>
+          </p:cNvPr>
+          <p:cNvPicPr>
+            <a:picLocks noChangeAspect="1"/>
+          </p:cNvPicPr>
+          <p:nvPr/>
+        </p:nvPicPr>
+        <p:blipFill rotWithShape="1">
+          <a:blip r:embed="rId4"/>
+          <a:srcRect l="1984" t="5753" r="4005" b="3662"/>
+          <a:stretch/>
+        </p:blipFill>
+        <p:spPr>
+          <a:xfrm>
+            <a:off x="562849" y="1119378"/>
+            <a:ext cx="2154582" cy="1473354"/>
+          </a:xfrm>
+          <a:prstGeom prst="snip2DiagRect">
+            <a:avLst/>
+          </a:prstGeom>
+          <a:solidFill>
+            <a:srgbClr val="FFFFFF">
+              <a:shade val="85000"/>
+            </a:srgbClr>
+          </a:solidFill>
+          <a:ln w="88900" cap="sq">
+            <a:solidFill>
+              <a:schemeClr val="tx1">
+                <a:lumMod val="95000"/>
+                <a:lumOff val="5000"/>
+              </a:schemeClr>
+            </a:solidFill>
+            <a:miter lim="800000"/>
+          </a:ln>
+          <a:effectLst>
+            <a:outerShdw blurRad="88900" algn="tl" rotWithShape="0">
+              <a:srgbClr val="000000">
+                <a:alpha val="45000"/>
+              </a:srgbClr>
+            </a:outerShdw>
+          </a:effectLst>
+          <a:scene3d>
+            <a:camera prst="orthographicFront"/>
+            <a:lightRig rig="twoPt" dir="t">
+              <a:rot lat="0" lon="0" rev="7200000"/>
+            </a:lightRig>
+          </a:scene3d>
+          <a:sp3d>
+            <a:bevelT w="25400" h="19050"/>
+            <a:contourClr>
+              <a:srgbClr val="FFFFFF"/>
+            </a:contourClr>
+          </a:sp3d>
+        </p:spPr>
+      </p:pic>
+      <p:pic>
+        <p:nvPicPr>
+          <p:cNvPr id="19" name="Picture 18">
+            <a:extLst>
+              <a:ext uri="{FF2B5EF4-FFF2-40B4-BE49-F238E27FC236}">
+                <a16:creationId xmlns:a16="http://schemas.microsoft.com/office/drawing/2014/main" id="{034B2FBB-CA44-4DE8-9696-D9B841F34FD4}"/>
+              </a:ext>
+            </a:extLst>
+          </p:cNvPr>
+          <p:cNvPicPr>
+            <a:picLocks noChangeAspect="1"/>
+          </p:cNvPicPr>
+          <p:nvPr/>
+        </p:nvPicPr>
+        <p:blipFill rotWithShape="1">
+          <a:blip r:embed="rId5"/>
+          <a:srcRect l="1169" t="3435" r="2804" b="8250"/>
+          <a:stretch/>
+        </p:blipFill>
+        <p:spPr>
+          <a:xfrm>
+            <a:off x="562849" y="3174288"/>
+            <a:ext cx="2154583" cy="1212988"/>
+          </a:xfrm>
+          <a:prstGeom prst="snip2DiagRect">
+            <a:avLst/>
+          </a:prstGeom>
+          <a:solidFill>
+            <a:srgbClr val="FFFFFF">
+              <a:shade val="85000"/>
+            </a:srgbClr>
+          </a:solidFill>
+          <a:ln w="88900" cap="sq">
+            <a:solidFill>
+              <a:schemeClr val="tx1">
+                <a:lumMod val="95000"/>
+                <a:lumOff val="5000"/>
+              </a:schemeClr>
+            </a:solidFill>
+            <a:miter lim="800000"/>
+          </a:ln>
+          <a:effectLst>
+            <a:outerShdw blurRad="88900" algn="tl" rotWithShape="0">
+              <a:srgbClr val="000000">
+                <a:alpha val="45000"/>
+              </a:srgbClr>
+            </a:outerShdw>
+          </a:effectLst>
+          <a:scene3d>
+            <a:camera prst="orthographicFront"/>
+            <a:lightRig rig="twoPt" dir="t">
+              <a:rot lat="0" lon="0" rev="7200000"/>
+            </a:lightRig>
+          </a:scene3d>
+          <a:sp3d>
+            <a:bevelT w="25400" h="19050"/>
+            <a:contourClr>
+              <a:srgbClr val="FFFFFF"/>
+            </a:contourClr>
+          </a:sp3d>
+        </p:spPr>
+      </p:pic>
     </p:spTree>
     <p:extLst>
       <p:ext uri="{BB962C8B-B14F-4D97-AF65-F5344CB8AC3E}">
@@ -3692,10 +4735,10 @@
       </p:grpSpPr>
       <p:pic>
         <p:nvPicPr>
-          <p:cNvPr id="6" name="Picture 2">
-            <a:extLst>
-              <a:ext uri="{FF2B5EF4-FFF2-40B4-BE49-F238E27FC236}">
-                <a16:creationId xmlns:a16="http://schemas.microsoft.com/office/drawing/2014/main" id="{C750F59D-7D99-4171-9C70-7F2B3106D5FE}"/>
+          <p:cNvPr id="11" name="Picture 2">
+            <a:extLst>
+              <a:ext uri="{FF2B5EF4-FFF2-40B4-BE49-F238E27FC236}">
+                <a16:creationId xmlns:a16="http://schemas.microsoft.com/office/drawing/2014/main" id="{3B2495D9-13B4-44A0-8CA6-FE232FF09923}"/>
               </a:ext>
             </a:extLst>
           </p:cNvPr>
@@ -3705,7 +4748,7 @@
           <p:nvPr/>
         </p:nvPicPr>
         <p:blipFill rotWithShape="1">
-          <a:blip r:embed="rId2">
+          <a:blip r:embed="rId3">
             <a:duotone>
               <a:prstClr val="black"/>
               <a:schemeClr val="accent1">
@@ -3719,12 +4762,25 @@
         </p:blipFill>
         <p:spPr>
           <a:xfrm>
-            <a:off x="20" y="10"/>
+            <a:off x="0" y="10"/>
             <a:ext cx="12191980" cy="6857990"/>
           </a:xfrm>
           <a:prstGeom prst="rect">
             <a:avLst/>
           </a:prstGeom>
+          <a:ln w="127000" cap="sq">
+            <a:solidFill>
+              <a:srgbClr val="000000"/>
+            </a:solidFill>
+            <a:miter lim="800000"/>
+          </a:ln>
+          <a:effectLst>
+            <a:innerShdw blurRad="63500" dist="50800" dir="18900000">
+              <a:prstClr val="black">
+                <a:alpha val="50000"/>
+              </a:prstClr>
+            </a:innerShdw>
+          </a:effectLst>
         </p:spPr>
       </p:pic>
       <p:sp>
@@ -3743,15 +4799,15 @@
         </p:nvSpPr>
         <p:spPr>
           <a:xfrm>
-            <a:off x="2445469" y="1819224"/>
-            <a:ext cx="7301061" cy="3219551"/>
+            <a:off x="176173" y="165275"/>
+            <a:ext cx="7301061" cy="584049"/>
           </a:xfrm>
           <a:prstGeom prst="rect">
             <a:avLst/>
           </a:prstGeom>
         </p:spPr>
         <p:txBody>
-          <a:bodyPr vert="horz" lIns="91440" tIns="45720" rIns="91440" bIns="45720" rtlCol="0" anchor="ctr">
+          <a:bodyPr vert="horz" lIns="91440" tIns="45720" rIns="91440" bIns="45720" rtlCol="0" anchor="t">
             <a:noAutofit/>
           </a:bodyPr>
           <a:lstStyle>
@@ -3774,6 +4830,7 @@
             </a:lvl1pPr>
           </a:lstStyle>
           <a:p>
+            <a:pPr algn="l"/>
             <a:r>
               <a:rPr lang="en-GB" sz="3200" b="1" dirty="0">
                 <a:solidFill>
@@ -3781,7 +4838,7 @@
                 </a:solidFill>
                 <a:latin typeface="Agency FB" panose="020B0503020202020204" pitchFamily="34" charset="0"/>
               </a:rPr>
-              <a:t>What I have done Prototype</a:t>
+              <a:t>The Dissertation Progress</a:t>
             </a:r>
           </a:p>
         </p:txBody>
@@ -3800,8 +4857,8 @@
         </p:nvSpPr>
         <p:spPr>
           <a:xfrm>
-            <a:off x="184067" y="124692"/>
-            <a:ext cx="4587603" cy="3693319"/>
+            <a:off x="387201" y="749324"/>
+            <a:ext cx="4705489" cy="2862322"/>
           </a:xfrm>
           <a:prstGeom prst="rect">
             <a:avLst/>
@@ -3809,194 +4866,385 @@
           <a:noFill/>
         </p:spPr>
         <p:txBody>
-          <a:bodyPr wrap="none" rtlCol="0">
+          <a:bodyPr wrap="square" rtlCol="0">
             <a:spAutoFit/>
           </a:bodyPr>
           <a:lstStyle/>
           <a:p>
-            <a:pPr marL="285750" indent="-285750">
-              <a:buFont typeface="Arial" panose="020B0604020202020204" pitchFamily="34" charset="0"/>
-              <a:buChar char="•"/>
+            <a:pPr marL="342900" indent="-342900">
+              <a:buFont typeface="+mj-lt"/>
+              <a:buAutoNum type="arabicPeriod"/>
             </a:pPr>
             <a:r>
               <a:rPr lang="en-GB" dirty="0">
                 <a:solidFill>
                   <a:schemeClr val="bg1"/>
                 </a:solidFill>
+                <a:latin typeface="Bahnschrift Light Condensed" panose="020B0502040204020203" pitchFamily="34" charset="0"/>
               </a:rPr>
-              <a:t>Processing</a:t>
-            </a:r>
-          </a:p>
-          <a:p>
-            <a:pPr marL="742950" lvl="1" indent="-285750">
-              <a:buFont typeface="Arial" panose="020B0604020202020204" pitchFamily="34" charset="0"/>
-              <a:buChar char="•"/>
+              <a:t>Introduction</a:t>
+            </a:r>
+          </a:p>
+          <a:p>
+            <a:pPr marL="800100" lvl="1" indent="-342900">
+              <a:buFont typeface="+mj-lt"/>
+              <a:buAutoNum type="arabicPeriod"/>
             </a:pPr>
             <a:r>
-              <a:rPr lang="en-GB" dirty="0">
+              <a:rPr lang="en-GB" sz="1600" dirty="0">
                 <a:solidFill>
                   <a:schemeClr val="bg1"/>
                 </a:solidFill>
+                <a:latin typeface="Bahnschrift Light Condensed" panose="020B0502040204020203" pitchFamily="34" charset="0"/>
               </a:rPr>
-              <a:t>Barracuda</a:t>
-            </a:r>
-          </a:p>
-          <a:p>
-            <a:pPr marL="1200150" lvl="2" indent="-285750">
-              <a:buFont typeface="Arial" panose="020B0604020202020204" pitchFamily="34" charset="0"/>
-              <a:buChar char="•"/>
+              <a:t>Context</a:t>
+            </a:r>
+          </a:p>
+          <a:p>
+            <a:pPr marL="800100" lvl="1" indent="-342900">
+              <a:buFont typeface="+mj-lt"/>
+              <a:buAutoNum type="arabicPeriod"/>
             </a:pPr>
             <a:r>
-              <a:rPr lang="en-GB" dirty="0" err="1">
+              <a:rPr lang="en-GB" sz="1600" dirty="0">
                 <a:solidFill>
                   <a:schemeClr val="bg1"/>
                 </a:solidFill>
+                <a:latin typeface="Bahnschrift Light Condensed" panose="020B0502040204020203" pitchFamily="34" charset="0"/>
               </a:rPr>
-              <a:t>Tensorflow</a:t>
-            </a:r>
-            <a:r>
-              <a:rPr lang="en-GB" dirty="0">
+              <a:t>Research Problem</a:t>
+            </a:r>
+          </a:p>
+          <a:p>
+            <a:pPr marL="800100" lvl="1" indent="-342900">
+              <a:buFont typeface="+mj-lt"/>
+              <a:buAutoNum type="arabicPeriod"/>
+            </a:pPr>
+            <a:r>
+              <a:rPr lang="en-GB" sz="1600" dirty="0">
                 <a:solidFill>
                   <a:schemeClr val="bg1"/>
                 </a:solidFill>
+                <a:latin typeface="Bahnschrift Light Condensed" panose="020B0502040204020203" pitchFamily="34" charset="0"/>
               </a:rPr>
-              <a:t> -&gt; ONNX -&gt; Barracuda</a:t>
-            </a:r>
-          </a:p>
-          <a:p>
-            <a:pPr marL="742950" lvl="1" indent="-285750">
-              <a:buFont typeface="Arial" panose="020B0604020202020204" pitchFamily="34" charset="0"/>
-              <a:buChar char="•"/>
+              <a:t>Project Aims</a:t>
+            </a:r>
+          </a:p>
+          <a:p>
+            <a:pPr marL="800100" lvl="1" indent="-342900">
+              <a:buFont typeface="+mj-lt"/>
+              <a:buAutoNum type="arabicPeriod"/>
             </a:pPr>
             <a:r>
-              <a:rPr lang="en-GB" dirty="0" err="1">
+              <a:rPr lang="en-GB" sz="1600" dirty="0">
                 <a:solidFill>
                   <a:schemeClr val="bg1"/>
                 </a:solidFill>
+                <a:latin typeface="Bahnschrift Light Condensed" panose="020B0502040204020203" pitchFamily="34" charset="0"/>
               </a:rPr>
-              <a:t>Tensorflow</a:t>
-            </a:r>
-            <a:endParaRPr lang="en-GB" dirty="0">
+              <a:t>Project Objectives</a:t>
+            </a:r>
+          </a:p>
+          <a:p>
+            <a:pPr marL="800100" lvl="1" indent="-342900">
+              <a:buFont typeface="+mj-lt"/>
+              <a:buAutoNum type="arabicPeriod"/>
+            </a:pPr>
+            <a:endParaRPr lang="en-GB" sz="1600" dirty="0">
               <a:solidFill>
                 <a:schemeClr val="bg1"/>
               </a:solidFill>
+              <a:latin typeface="Bahnschrift Light Condensed" panose="020B0502040204020203" pitchFamily="34" charset="0"/>
             </a:endParaRPr>
           </a:p>
           <a:p>
-            <a:pPr marL="1200150" lvl="2" indent="-285750">
-              <a:buFont typeface="Arial" panose="020B0604020202020204" pitchFamily="34" charset="0"/>
-              <a:buChar char="•"/>
+            <a:pPr marL="342900" indent="-342900">
+              <a:buFont typeface="+mj-lt"/>
+              <a:buAutoNum type="arabicPeriod"/>
             </a:pPr>
             <a:r>
               <a:rPr lang="en-GB" dirty="0">
                 <a:solidFill>
                   <a:schemeClr val="bg1"/>
                 </a:solidFill>
+                <a:latin typeface="Bahnschrift Light Condensed" panose="020B0502040204020203" pitchFamily="34" charset="0"/>
               </a:rPr>
-              <a:t>XOR</a:t>
-            </a:r>
-          </a:p>
-          <a:p>
-            <a:pPr marL="1200150" lvl="2" indent="-285750">
-              <a:buFont typeface="Arial" panose="020B0604020202020204" pitchFamily="34" charset="0"/>
-              <a:buChar char="•"/>
+              <a:t>Lit Review</a:t>
+            </a:r>
+          </a:p>
+          <a:p>
+            <a:pPr marL="800100" lvl="1" indent="-342900">
+              <a:buFont typeface="+mj-lt"/>
+              <a:buAutoNum type="arabicPeriod"/>
             </a:pPr>
             <a:r>
-              <a:rPr lang="en-GB" dirty="0">
+              <a:rPr lang="en-GB" sz="1600" dirty="0">
                 <a:solidFill>
                   <a:schemeClr val="bg1"/>
                 </a:solidFill>
+                <a:latin typeface="Bahnschrift Light Condensed" panose="020B0502040204020203" pitchFamily="34" charset="0"/>
               </a:rPr>
-              <a:t>Offline processing</a:t>
-            </a:r>
-          </a:p>
-          <a:p>
-            <a:pPr marL="1200150" lvl="2" indent="-285750">
-              <a:buFont typeface="Arial" panose="020B0604020202020204" pitchFamily="34" charset="0"/>
-              <a:buChar char="•"/>
+              <a:t>Current examples of multi-modal input systems</a:t>
+            </a:r>
+          </a:p>
+          <a:p>
+            <a:pPr marL="800100" lvl="1" indent="-342900">
+              <a:buFont typeface="+mj-lt"/>
+              <a:buAutoNum type="arabicPeriod"/>
             </a:pPr>
             <a:r>
-              <a:rPr lang="en-GB" dirty="0">
+              <a:rPr lang="en-GB" sz="1600" dirty="0">
                 <a:solidFill>
                   <a:schemeClr val="bg1"/>
                 </a:solidFill>
+                <a:latin typeface="Bahnschrift Light Condensed" panose="020B0502040204020203" pitchFamily="34" charset="0"/>
               </a:rPr>
-              <a:t>Open Vibe</a:t>
-            </a:r>
-          </a:p>
-          <a:p>
-            <a:pPr marL="285750" indent="-285750">
-              <a:buFont typeface="Arial" panose="020B0604020202020204" pitchFamily="34" charset="0"/>
-              <a:buChar char="•"/>
+              <a:t>Uni-modal EEG systems in gaming</a:t>
+            </a:r>
+          </a:p>
+          <a:p>
+            <a:pPr marL="800100" lvl="1" indent="-342900">
+              <a:buFont typeface="+mj-lt"/>
+              <a:buAutoNum type="arabicPeriod"/>
             </a:pPr>
             <a:r>
-              <a:rPr lang="en-GB" dirty="0">
+              <a:rPr lang="en-GB" sz="1600" dirty="0">
                 <a:solidFill>
                   <a:schemeClr val="bg1"/>
                 </a:solidFill>
+                <a:latin typeface="Bahnschrift Light Condensed" panose="020B0502040204020203" pitchFamily="34" charset="0"/>
               </a:rPr>
-              <a:t>Data Capture</a:t>
-            </a:r>
-          </a:p>
-          <a:p>
-            <a:pPr marL="742950" lvl="1" indent="-285750">
-              <a:buFont typeface="Arial" panose="020B0604020202020204" pitchFamily="34" charset="0"/>
-              <a:buChar char="•"/>
+              <a:t>Uni-modal EMG systems in gaming</a:t>
+            </a:r>
+          </a:p>
+          <a:p>
+            <a:pPr marL="800100" lvl="1" indent="-342900">
+              <a:buFont typeface="+mj-lt"/>
+              <a:buAutoNum type="arabicPeriod"/>
             </a:pPr>
             <a:r>
-              <a:rPr lang="en-GB" dirty="0">
+              <a:rPr lang="en-GB" sz="1600" dirty="0">
                 <a:solidFill>
                   <a:schemeClr val="bg1"/>
                 </a:solidFill>
+                <a:latin typeface="Bahnschrift Light Condensed" panose="020B0502040204020203" pitchFamily="34" charset="0"/>
               </a:rPr>
-              <a:t>LSL</a:t>
-            </a:r>
-          </a:p>
-          <a:p>
-            <a:pPr marL="1200150" lvl="2" indent="-285750">
-              <a:buFont typeface="Arial" panose="020B0604020202020204" pitchFamily="34" charset="0"/>
-              <a:buChar char="•"/>
-            </a:pPr>
-            <a:r>
-              <a:rPr lang="en-GB" dirty="0">
+              <a:t>EEG / EMG based multi modal input systems</a:t>
+            </a:r>
+          </a:p>
+        </p:txBody>
+      </p:sp>
+      <p:sp>
+        <p:nvSpPr>
+          <p:cNvPr id="10" name="Rectangle 9">
+            <a:extLst>
+              <a:ext uri="{FF2B5EF4-FFF2-40B4-BE49-F238E27FC236}">
+                <a16:creationId xmlns:a16="http://schemas.microsoft.com/office/drawing/2014/main" id="{34FE6FE9-3BAE-4C4D-9FDF-FAF699612411}"/>
+              </a:ext>
+            </a:extLst>
+          </p:cNvPr>
+          <p:cNvSpPr/>
+          <p:nvPr/>
+        </p:nvSpPr>
+        <p:spPr>
+          <a:xfrm>
+            <a:off x="3477391" y="1"/>
+            <a:ext cx="8714610" cy="6858000"/>
+          </a:xfrm>
+          <a:prstGeom prst="rect">
+            <a:avLst/>
+          </a:prstGeom>
+          <a:gradFill>
+            <a:gsLst>
+              <a:gs pos="81000">
+                <a:schemeClr val="tx1">
+                  <a:alpha val="39000"/>
+                </a:schemeClr>
+              </a:gs>
+              <a:gs pos="100000">
+                <a:schemeClr val="tx1">
+                  <a:alpha val="0"/>
+                </a:schemeClr>
+              </a:gs>
+            </a:gsLst>
+            <a:lin ang="10800000" scaled="1"/>
+          </a:gradFill>
+          <a:ln>
+            <a:noFill/>
+          </a:ln>
+        </p:spPr>
+        <p:style>
+          <a:lnRef idx="2">
+            <a:schemeClr val="dk1">
+              <a:shade val="50000"/>
+            </a:schemeClr>
+          </a:lnRef>
+          <a:fillRef idx="1">
+            <a:schemeClr val="dk1"/>
+          </a:fillRef>
+          <a:effectRef idx="0">
+            <a:schemeClr val="dk1"/>
+          </a:effectRef>
+          <a:fontRef idx="minor">
+            <a:schemeClr val="lt1"/>
+          </a:fontRef>
+        </p:style>
+        <p:txBody>
+          <a:bodyPr rtlCol="0" anchor="ctr"/>
+          <a:lstStyle/>
+          <a:p>
+            <a:pPr algn="ctr"/>
+            <a:endParaRPr lang="en-GB"/>
+          </a:p>
+        </p:txBody>
+      </p:sp>
+      <p:pic>
+        <p:nvPicPr>
+          <p:cNvPr id="5" name="Picture 4">
+            <a:extLst>
+              <a:ext uri="{FF2B5EF4-FFF2-40B4-BE49-F238E27FC236}">
+                <a16:creationId xmlns:a16="http://schemas.microsoft.com/office/drawing/2014/main" id="{69B6B275-FA9E-4E2F-AD0A-EF903BE0BED5}"/>
+              </a:ext>
+            </a:extLst>
+          </p:cNvPr>
+          <p:cNvPicPr>
+            <a:picLocks noChangeAspect="1"/>
+          </p:cNvPicPr>
+          <p:nvPr/>
+        </p:nvPicPr>
+        <p:blipFill rotWithShape="1">
+          <a:blip r:embed="rId4"/>
+          <a:srcRect l="2072" t="1607" r="3952" b="1628"/>
+          <a:stretch/>
+        </p:blipFill>
+        <p:spPr>
+          <a:xfrm>
+            <a:off x="5801306" y="372436"/>
+            <a:ext cx="3813159" cy="5376555"/>
+          </a:xfrm>
+          <a:prstGeom prst="rect">
+            <a:avLst/>
+          </a:prstGeom>
+          <a:ln>
+            <a:noFill/>
+          </a:ln>
+          <a:effectLst>
+            <a:outerShdw blurRad="190500" algn="tl" rotWithShape="0">
+              <a:srgbClr val="000000">
+                <a:alpha val="70000"/>
+              </a:srgbClr>
+            </a:outerShdw>
+          </a:effectLst>
+          <a:scene3d>
+            <a:camera prst="perspectiveHeroicExtremeLeftFacing" fov="4800000">
+              <a:rot lat="21403170" lon="21296866" rev="21539504"/>
+            </a:camera>
+            <a:lightRig rig="threePt" dir="t"/>
+          </a:scene3d>
+          <a:sp3d prstMaterial="matte"/>
+        </p:spPr>
+      </p:pic>
+      <p:pic>
+        <p:nvPicPr>
+          <p:cNvPr id="4" name="Picture 3">
+            <a:extLst>
+              <a:ext uri="{FF2B5EF4-FFF2-40B4-BE49-F238E27FC236}">
+                <a16:creationId xmlns:a16="http://schemas.microsoft.com/office/drawing/2014/main" id="{672F904F-26F9-40A2-AA54-EDDDA7A35A79}"/>
+              </a:ext>
+            </a:extLst>
+          </p:cNvPr>
+          <p:cNvPicPr>
+            <a:picLocks noChangeAspect="1"/>
+          </p:cNvPicPr>
+          <p:nvPr/>
+        </p:nvPicPr>
+        <p:blipFill rotWithShape="1">
+          <a:blip r:embed="rId5"/>
+          <a:srcRect l="2011" t="1373" r="2465" b="1764"/>
+          <a:stretch/>
+        </p:blipFill>
+        <p:spPr>
+          <a:xfrm>
+            <a:off x="7580516" y="690790"/>
+            <a:ext cx="3987974" cy="5612705"/>
+          </a:xfrm>
+          <a:prstGeom prst="rect">
+            <a:avLst/>
+          </a:prstGeom>
+          <a:ln>
+            <a:noFill/>
+          </a:ln>
+          <a:effectLst>
+            <a:outerShdw blurRad="50800" dist="38100" dir="13500000" algn="br" rotWithShape="0">
+              <a:prstClr val="black">
+                <a:alpha val="40000"/>
+              </a:prstClr>
+            </a:outerShdw>
+          </a:effectLst>
+          <a:scene3d>
+            <a:camera prst="perspectiveHeroicExtremeLeftFacing">
+              <a:rot lat="95191" lon="563431" rev="21560606"/>
+            </a:camera>
+            <a:lightRig rig="threePt" dir="t"/>
+          </a:scene3d>
+          <a:sp3d prstMaterial="matte"/>
+        </p:spPr>
+      </p:pic>
+      <p:sp>
+        <p:nvSpPr>
+          <p:cNvPr id="9" name="TextBox 8">
+            <a:extLst>
+              <a:ext uri="{FF2B5EF4-FFF2-40B4-BE49-F238E27FC236}">
+                <a16:creationId xmlns:a16="http://schemas.microsoft.com/office/drawing/2014/main" id="{E2808B9A-4DAD-421F-94FB-637C92B63037}"/>
+              </a:ext>
+            </a:extLst>
+          </p:cNvPr>
+          <p:cNvSpPr txBox="1"/>
+          <p:nvPr/>
+        </p:nvSpPr>
+        <p:spPr>
+          <a:xfrm>
+            <a:off x="176173" y="6149101"/>
+            <a:ext cx="6097112" cy="523220"/>
+          </a:xfrm>
+          <a:prstGeom prst="rect">
+            <a:avLst/>
+          </a:prstGeom>
+          <a:noFill/>
+        </p:spPr>
+        <p:txBody>
+          <a:bodyPr wrap="square" anchor="b">
+            <a:spAutoFit/>
+          </a:bodyPr>
+          <a:lstStyle/>
+          <a:p>
+            <a:r>
+              <a:rPr lang="en-GB" sz="1400" dirty="0">
                 <a:solidFill>
                   <a:schemeClr val="bg1"/>
                 </a:solidFill>
+                <a:latin typeface="+mj-lt"/>
               </a:rPr>
-              <a:t>EEG</a:t>
-            </a:r>
-          </a:p>
-          <a:p>
-            <a:pPr marL="742950" lvl="1" indent="-285750">
-              <a:buFont typeface="Arial" panose="020B0604020202020204" pitchFamily="34" charset="0"/>
-              <a:buChar char="•"/>
-            </a:pPr>
-            <a:endParaRPr lang="en-GB" dirty="0">
-              <a:solidFill>
-                <a:schemeClr val="bg1"/>
-              </a:solidFill>
-            </a:endParaRPr>
-          </a:p>
-          <a:p>
-            <a:endParaRPr lang="en-GB" dirty="0">
-              <a:solidFill>
-                <a:schemeClr val="bg1"/>
-              </a:solidFill>
-            </a:endParaRPr>
-          </a:p>
-          <a:p>
-            <a:endParaRPr lang="en-GB" dirty="0">
-              <a:solidFill>
-                <a:schemeClr val="bg1"/>
-              </a:solidFill>
-            </a:endParaRPr>
+              <a:t>Reference Count: 23 papers </a:t>
+            </a:r>
+          </a:p>
+          <a:p>
+            <a:r>
+              <a:rPr lang="en-GB" sz="1400" dirty="0">
+                <a:solidFill>
+                  <a:schemeClr val="bg1"/>
+                </a:solidFill>
+                <a:latin typeface="+mj-lt"/>
+              </a:rPr>
+              <a:t>Roughly 2000 words </a:t>
+            </a:r>
           </a:p>
         </p:txBody>
       </p:sp>
     </p:spTree>
     <p:extLst>
       <p:ext uri="{BB962C8B-B14F-4D97-AF65-F5344CB8AC3E}">
-        <p14:creationId xmlns:p14="http://schemas.microsoft.com/office/powerpoint/2010/main" val="3476678281"/>
+        <p14:creationId xmlns:p14="http://schemas.microsoft.com/office/powerpoint/2010/main" val="1691942071"/>
       </p:ext>
     </p:extLst>
   </p:cSld>
@@ -4025,10 +5273,10 @@
       </p:grpSpPr>
       <p:pic>
         <p:nvPicPr>
-          <p:cNvPr id="6" name="Picture 2">
-            <a:extLst>
-              <a:ext uri="{FF2B5EF4-FFF2-40B4-BE49-F238E27FC236}">
-                <a16:creationId xmlns:a16="http://schemas.microsoft.com/office/drawing/2014/main" id="{C750F59D-7D99-4171-9C70-7F2B3106D5FE}"/>
+          <p:cNvPr id="5" name="Picture 2">
+            <a:extLst>
+              <a:ext uri="{FF2B5EF4-FFF2-40B4-BE49-F238E27FC236}">
+                <a16:creationId xmlns:a16="http://schemas.microsoft.com/office/drawing/2014/main" id="{0945BA12-DDE0-40C1-B71D-545D9D522D44}"/>
               </a:ext>
             </a:extLst>
           </p:cNvPr>
@@ -4052,12 +5300,25 @@
         </p:blipFill>
         <p:spPr>
           <a:xfrm>
-            <a:off x="20" y="10"/>
+            <a:off x="0" y="10"/>
             <a:ext cx="12191980" cy="6857990"/>
           </a:xfrm>
           <a:prstGeom prst="rect">
             <a:avLst/>
           </a:prstGeom>
+          <a:ln w="127000" cap="sq">
+            <a:solidFill>
+              <a:srgbClr val="000000"/>
+            </a:solidFill>
+            <a:miter lim="800000"/>
+          </a:ln>
+          <a:effectLst>
+            <a:innerShdw blurRad="63500" dist="50800" dir="18900000">
+              <a:prstClr val="black">
+                <a:alpha val="50000"/>
+              </a:prstClr>
+            </a:innerShdw>
+          </a:effectLst>
         </p:spPr>
       </p:pic>
       <p:sp>
@@ -4114,7 +5375,7 @@
                 </a:solidFill>
                 <a:latin typeface="Agency FB" panose="020B0503020202020204" pitchFamily="34" charset="0"/>
               </a:rPr>
-              <a:t>What I have done Dissertation</a:t>
+              <a:t>What I have done Prototype</a:t>
             </a:r>
           </a:p>
         </p:txBody>
@@ -4134,7 +5395,7 @@
         <p:spPr>
           <a:xfrm>
             <a:off x="184067" y="124692"/>
-            <a:ext cx="6132320" cy="4247317"/>
+            <a:ext cx="4587603" cy="3693319"/>
           </a:xfrm>
           <a:prstGeom prst="rect">
             <a:avLst/>
@@ -4157,7 +5418,7 @@
                   <a:schemeClr val="bg1"/>
                 </a:solidFill>
               </a:rPr>
-              <a:t>Introduction</a:t>
+              <a:t>Processing</a:t>
             </a:r>
           </a:p>
           <a:p>
@@ -4171,7 +5432,21 @@
                   <a:schemeClr val="bg1"/>
                 </a:solidFill>
               </a:rPr>
-              <a:t>Context</a:t>
+              <a:t>Barracuda</a:t>
+            </a:r>
+          </a:p>
+          <a:p>
+            <a:pPr marL="1200150" lvl="2" indent="-285750">
+              <a:buFont typeface="Arial" panose="020B0604020202020204" pitchFamily="34" charset="0"/>
+              <a:buChar char="•"/>
+            </a:pPr>
+            <a:r>
+              <a:rPr lang="en-GB" dirty="0">
+                <a:solidFill>
+                  <a:schemeClr val="bg1"/>
+                </a:solidFill>
+              </a:rPr>
+              <a:t>Tensorflow -&gt; ONNX -&gt; Barracuda</a:t>
             </a:r>
           </a:p>
           <a:p>
@@ -4185,7 +5460,49 @@
                   <a:schemeClr val="bg1"/>
                 </a:solidFill>
               </a:rPr>
-              <a:t>Research Aims and Objectives</a:t>
+              <a:t>Tensorflow</a:t>
+            </a:r>
+          </a:p>
+          <a:p>
+            <a:pPr marL="1200150" lvl="2" indent="-285750">
+              <a:buFont typeface="Arial" panose="020B0604020202020204" pitchFamily="34" charset="0"/>
+              <a:buChar char="•"/>
+            </a:pPr>
+            <a:r>
+              <a:rPr lang="en-GB" dirty="0">
+                <a:solidFill>
+                  <a:schemeClr val="bg1"/>
+                </a:solidFill>
+              </a:rPr>
+              <a:t>XOR</a:t>
+            </a:r>
+          </a:p>
+          <a:p>
+            <a:pPr marL="1200150" lvl="2" indent="-285750">
+              <a:buFont typeface="Arial" panose="020B0604020202020204" pitchFamily="34" charset="0"/>
+              <a:buChar char="•"/>
+            </a:pPr>
+            <a:r>
+              <a:rPr lang="en-GB" dirty="0">
+                <a:solidFill>
+                  <a:schemeClr val="bg1"/>
+                </a:solidFill>
+              </a:rPr>
+              <a:t>Offline processing</a:t>
+            </a:r>
+          </a:p>
+          <a:p>
+            <a:pPr marL="1200150" lvl="2" indent="-285750">
+              <a:buFont typeface="Arial" panose="020B0604020202020204" pitchFamily="34" charset="0"/>
+              <a:buChar char="•"/>
+            </a:pPr>
+            <a:r>
+              <a:rPr lang="en-GB" dirty="0">
+                <a:solidFill>
+                  <a:schemeClr val="bg1"/>
+                </a:solidFill>
+              </a:rPr>
+              <a:t>Open Vibe</a:t>
             </a:r>
           </a:p>
           <a:p>
@@ -4199,7 +5516,7 @@
                   <a:schemeClr val="bg1"/>
                 </a:solidFill>
               </a:rPr>
-              <a:t>Lit Review</a:t>
+              <a:t>Data Capture</a:t>
             </a:r>
           </a:p>
           <a:p>
@@ -4213,11 +5530,11 @@
                   <a:schemeClr val="bg1"/>
                 </a:solidFill>
               </a:rPr>
-              <a:t>EEG in gaming</a:t>
-            </a:r>
-          </a:p>
-          <a:p>
-            <a:pPr marL="742950" lvl="1" indent="-285750">
+              <a:t>LSL</a:t>
+            </a:r>
+          </a:p>
+          <a:p>
+            <a:pPr marL="1200150" lvl="2" indent="-285750">
               <a:buFont typeface="Arial" panose="020B0604020202020204" pitchFamily="34" charset="0"/>
               <a:buChar char="•"/>
             </a:pPr>
@@ -4227,102 +5544,8 @@
                   <a:schemeClr val="bg1"/>
                 </a:solidFill>
               </a:rPr>
-              <a:t>EMG in gaming</a:t>
-            </a:r>
-          </a:p>
-          <a:p>
-            <a:pPr marL="742950" lvl="1" indent="-285750">
-              <a:buFont typeface="Arial" panose="020B0604020202020204" pitchFamily="34" charset="0"/>
-              <a:buChar char="•"/>
-            </a:pPr>
-            <a:r>
-              <a:rPr lang="en-GB" dirty="0">
-                <a:solidFill>
-                  <a:schemeClr val="bg1"/>
-                </a:solidFill>
-              </a:rPr>
-              <a:t>Multi Modal Input Systems</a:t>
-            </a:r>
-          </a:p>
-          <a:p>
-            <a:pPr marL="742950" lvl="1" indent="-285750">
-              <a:buFont typeface="Arial" panose="020B0604020202020204" pitchFamily="34" charset="0"/>
-              <a:buChar char="•"/>
-            </a:pPr>
-            <a:r>
-              <a:rPr lang="en-GB" dirty="0">
-                <a:solidFill>
-                  <a:schemeClr val="bg1"/>
-                </a:solidFill>
-              </a:rPr>
-              <a:t>EEG / EMG based multi modal input systems (</a:t>
-            </a:r>
-            <a:r>
-              <a:rPr lang="en-GB" dirty="0" err="1">
-                <a:solidFill>
-                  <a:schemeClr val="bg1"/>
-                </a:solidFill>
-              </a:rPr>
-              <a:t>prosthics</a:t>
-            </a:r>
-            <a:r>
-              <a:rPr lang="en-GB" dirty="0">
-                <a:solidFill>
-                  <a:schemeClr val="bg1"/>
-                </a:solidFill>
-              </a:rPr>
-              <a:t>)</a:t>
-            </a:r>
-          </a:p>
-          <a:p>
-            <a:pPr marL="742950" lvl="1" indent="-285750">
-              <a:buFont typeface="Arial" panose="020B0604020202020204" pitchFamily="34" charset="0"/>
-              <a:buChar char="•"/>
-            </a:pPr>
-            <a:r>
-              <a:rPr lang="en-GB" dirty="0">
-                <a:solidFill>
-                  <a:schemeClr val="bg1"/>
-                </a:solidFill>
-              </a:rPr>
-              <a:t>Analysis / AI</a:t>
-            </a:r>
-          </a:p>
-          <a:p>
-            <a:pPr marL="285750" indent="-285750">
-              <a:buFont typeface="Arial" panose="020B0604020202020204" pitchFamily="34" charset="0"/>
-              <a:buChar char="•"/>
-            </a:pPr>
-            <a:endParaRPr lang="en-GB" dirty="0">
-              <a:solidFill>
-                <a:schemeClr val="bg1"/>
-              </a:solidFill>
-            </a:endParaRPr>
-          </a:p>
-          <a:p>
-            <a:pPr marL="285750" indent="-285750">
-              <a:buFont typeface="Arial" panose="020B0604020202020204" pitchFamily="34" charset="0"/>
-              <a:buChar char="•"/>
-            </a:pPr>
-            <a:r>
-              <a:rPr lang="en-GB" dirty="0">
-                <a:solidFill>
-                  <a:schemeClr val="bg1"/>
-                </a:solidFill>
-              </a:rPr>
-              <a:t>Roughly 2000 words </a:t>
-            </a:r>
-          </a:p>
-          <a:p>
-            <a:pPr marL="285750" indent="-285750">
-              <a:buFont typeface="Arial" panose="020B0604020202020204" pitchFamily="34" charset="0"/>
-              <a:buChar char="•"/>
-            </a:pPr>
-            <a:endParaRPr lang="en-GB" dirty="0">
-              <a:solidFill>
-                <a:schemeClr val="bg1"/>
-              </a:solidFill>
-            </a:endParaRPr>
+              <a:t>EEG</a:t>
+            </a:r>
           </a:p>
           <a:p>
             <a:pPr marL="742950" lvl="1" indent="-285750">
@@ -4354,7 +5577,7 @@
     </p:spTree>
     <p:extLst>
       <p:ext uri="{BB962C8B-B14F-4D97-AF65-F5344CB8AC3E}">
-        <p14:creationId xmlns:p14="http://schemas.microsoft.com/office/powerpoint/2010/main" val="1691942071"/>
+        <p14:creationId xmlns:p14="http://schemas.microsoft.com/office/powerpoint/2010/main" val="3476678281"/>
       </p:ext>
     </p:extLst>
   </p:cSld>
@@ -4383,10 +5606,10 @@
       </p:grpSpPr>
       <p:pic>
         <p:nvPicPr>
-          <p:cNvPr id="6" name="Picture 2">
-            <a:extLst>
-              <a:ext uri="{FF2B5EF4-FFF2-40B4-BE49-F238E27FC236}">
-                <a16:creationId xmlns:a16="http://schemas.microsoft.com/office/drawing/2014/main" id="{C750F59D-7D99-4171-9C70-7F2B3106D5FE}"/>
+          <p:cNvPr id="5" name="Picture 2">
+            <a:extLst>
+              <a:ext uri="{FF2B5EF4-FFF2-40B4-BE49-F238E27FC236}">
+                <a16:creationId xmlns:a16="http://schemas.microsoft.com/office/drawing/2014/main" id="{8FE551F4-4DD2-488D-BB2B-61BE5F1D3358}"/>
               </a:ext>
             </a:extLst>
           </p:cNvPr>
@@ -4410,12 +5633,25 @@
         </p:blipFill>
         <p:spPr>
           <a:xfrm>
-            <a:off x="20" y="10"/>
+            <a:off x="0" y="10"/>
             <a:ext cx="12191980" cy="6857990"/>
           </a:xfrm>
           <a:prstGeom prst="rect">
             <a:avLst/>
           </a:prstGeom>
+          <a:ln w="127000" cap="sq">
+            <a:solidFill>
+              <a:srgbClr val="000000"/>
+            </a:solidFill>
+            <a:miter lim="800000"/>
+          </a:ln>
+          <a:effectLst>
+            <a:innerShdw blurRad="63500" dist="50800" dir="18900000">
+              <a:prstClr val="black">
+                <a:alpha val="50000"/>
+              </a:prstClr>
+            </a:innerShdw>
+          </a:effectLst>
         </p:spPr>
       </p:pic>
       <p:sp>
@@ -4602,10 +5838,10 @@
       </p:grpSpPr>
       <p:pic>
         <p:nvPicPr>
-          <p:cNvPr id="6" name="Picture 2">
-            <a:extLst>
-              <a:ext uri="{FF2B5EF4-FFF2-40B4-BE49-F238E27FC236}">
-                <a16:creationId xmlns:a16="http://schemas.microsoft.com/office/drawing/2014/main" id="{C750F59D-7D99-4171-9C70-7F2B3106D5FE}"/>
+          <p:cNvPr id="4" name="Picture 2">
+            <a:extLst>
+              <a:ext uri="{FF2B5EF4-FFF2-40B4-BE49-F238E27FC236}">
+                <a16:creationId xmlns:a16="http://schemas.microsoft.com/office/drawing/2014/main" id="{90A3CDE6-432A-4A55-88AC-B069F06C1279}"/>
               </a:ext>
             </a:extLst>
           </p:cNvPr>
@@ -4629,12 +5865,25 @@
         </p:blipFill>
         <p:spPr>
           <a:xfrm>
-            <a:off x="20" y="10"/>
+            <a:off x="0" y="10"/>
             <a:ext cx="12191980" cy="6857990"/>
           </a:xfrm>
           <a:prstGeom prst="rect">
             <a:avLst/>
           </a:prstGeom>
+          <a:ln w="127000" cap="sq">
+            <a:solidFill>
+              <a:srgbClr val="000000"/>
+            </a:solidFill>
+            <a:miter lim="800000"/>
+          </a:ln>
+          <a:effectLst>
+            <a:innerShdw blurRad="63500" dist="50800" dir="18900000">
+              <a:prstClr val="black">
+                <a:alpha val="50000"/>
+              </a:prstClr>
+            </a:innerShdw>
+          </a:effectLst>
         </p:spPr>
       </p:pic>
       <p:sp>
@@ -4754,10 +6003,10 @@
       </p:grpSpPr>
       <p:pic>
         <p:nvPicPr>
-          <p:cNvPr id="6" name="Picture 2">
-            <a:extLst>
-              <a:ext uri="{FF2B5EF4-FFF2-40B4-BE49-F238E27FC236}">
-                <a16:creationId xmlns:a16="http://schemas.microsoft.com/office/drawing/2014/main" id="{C750F59D-7D99-4171-9C70-7F2B3106D5FE}"/>
+          <p:cNvPr id="4" name="Picture 2">
+            <a:extLst>
+              <a:ext uri="{FF2B5EF4-FFF2-40B4-BE49-F238E27FC236}">
+                <a16:creationId xmlns:a16="http://schemas.microsoft.com/office/drawing/2014/main" id="{80A1ED77-BAF5-4637-A324-47A55826878B}"/>
               </a:ext>
             </a:extLst>
           </p:cNvPr>
@@ -4781,20 +6030,266 @@
         </p:blipFill>
         <p:spPr>
           <a:xfrm>
-            <a:off x="20" y="10"/>
+            <a:off x="0" y="10"/>
             <a:ext cx="12191980" cy="6857990"/>
           </a:xfrm>
           <a:prstGeom prst="rect">
             <a:avLst/>
           </a:prstGeom>
+          <a:ln w="127000" cap="sq">
+            <a:solidFill>
+              <a:srgbClr val="000000"/>
+            </a:solidFill>
+            <a:miter lim="800000"/>
+          </a:ln>
+          <a:effectLst>
+            <a:innerShdw blurRad="63500" dist="50800" dir="18900000">
+              <a:prstClr val="black">
+                <a:alpha val="50000"/>
+              </a:prstClr>
+            </a:innerShdw>
+          </a:effectLst>
         </p:spPr>
       </p:pic>
       <p:sp>
         <p:nvSpPr>
-          <p:cNvPr id="7" name="Title 1">
-            <a:extLst>
-              <a:ext uri="{FF2B5EF4-FFF2-40B4-BE49-F238E27FC236}">
-                <a16:creationId xmlns:a16="http://schemas.microsoft.com/office/drawing/2014/main" id="{37DC246B-15A1-4ECD-B936-5B3331447342}"/>
+          <p:cNvPr id="12" name="Rectangle 11">
+            <a:extLst>
+              <a:ext uri="{FF2B5EF4-FFF2-40B4-BE49-F238E27FC236}">
+                <a16:creationId xmlns:a16="http://schemas.microsoft.com/office/drawing/2014/main" id="{35D63274-D83F-4FB0-8384-EBC402CB2911}"/>
+              </a:ext>
+            </a:extLst>
+          </p:cNvPr>
+          <p:cNvSpPr/>
+          <p:nvPr/>
+        </p:nvSpPr>
+        <p:spPr>
+          <a:xfrm>
+            <a:off x="3477391" y="1"/>
+            <a:ext cx="8714610" cy="6858000"/>
+          </a:xfrm>
+          <a:prstGeom prst="rect">
+            <a:avLst/>
+          </a:prstGeom>
+          <a:gradFill>
+            <a:gsLst>
+              <a:gs pos="81000">
+                <a:schemeClr val="tx1">
+                  <a:alpha val="39000"/>
+                </a:schemeClr>
+              </a:gs>
+              <a:gs pos="100000">
+                <a:schemeClr val="tx1">
+                  <a:alpha val="0"/>
+                </a:schemeClr>
+              </a:gs>
+            </a:gsLst>
+            <a:lin ang="10800000" scaled="1"/>
+          </a:gradFill>
+          <a:ln>
+            <a:noFill/>
+          </a:ln>
+        </p:spPr>
+        <p:style>
+          <a:lnRef idx="2">
+            <a:schemeClr val="dk1">
+              <a:shade val="50000"/>
+            </a:schemeClr>
+          </a:lnRef>
+          <a:fillRef idx="1">
+            <a:schemeClr val="dk1"/>
+          </a:fillRef>
+          <a:effectRef idx="0">
+            <a:schemeClr val="dk1"/>
+          </a:effectRef>
+          <a:fontRef idx="minor">
+            <a:schemeClr val="lt1"/>
+          </a:fontRef>
+        </p:style>
+        <p:txBody>
+          <a:bodyPr rtlCol="0" anchor="ctr"/>
+          <a:lstStyle/>
+          <a:p>
+            <a:pPr algn="ctr"/>
+            <a:endParaRPr lang="en-GB"/>
+          </a:p>
+        </p:txBody>
+      </p:sp>
+      <p:pic>
+        <p:nvPicPr>
+          <p:cNvPr id="5" name="Picture 4">
+            <a:extLst>
+              <a:ext uri="{FF2B5EF4-FFF2-40B4-BE49-F238E27FC236}">
+                <a16:creationId xmlns:a16="http://schemas.microsoft.com/office/drawing/2014/main" id="{2350122C-CAF5-4389-B6C7-15BDE6FEEE5B}"/>
+              </a:ext>
+            </a:extLst>
+          </p:cNvPr>
+          <p:cNvPicPr>
+            <a:picLocks noChangeAspect="1"/>
+          </p:cNvPicPr>
+          <p:nvPr/>
+        </p:nvPicPr>
+        <p:blipFill>
+          <a:blip r:embed="rId3"/>
+          <a:stretch>
+            <a:fillRect/>
+          </a:stretch>
+        </p:blipFill>
+        <p:spPr>
+          <a:xfrm>
+            <a:off x="176173" y="1404694"/>
+            <a:ext cx="7917288" cy="4033203"/>
+          </a:xfrm>
+          <a:prstGeom prst="rect">
+            <a:avLst/>
+          </a:prstGeom>
+          <a:ln>
+            <a:noFill/>
+          </a:ln>
+          <a:effectLst>
+            <a:outerShdw blurRad="292100" dist="139700" dir="2700000" algn="tl" rotWithShape="0">
+              <a:srgbClr val="333333">
+                <a:alpha val="65000"/>
+              </a:srgbClr>
+            </a:outerShdw>
+          </a:effectLst>
+        </p:spPr>
+      </p:pic>
+      <p:cxnSp>
+        <p:nvCxnSpPr>
+          <p:cNvPr id="8" name="Straight Connector 7">
+            <a:extLst>
+              <a:ext uri="{FF2B5EF4-FFF2-40B4-BE49-F238E27FC236}">
+                <a16:creationId xmlns:a16="http://schemas.microsoft.com/office/drawing/2014/main" id="{43BEEB66-A128-4DF9-B702-B9EB7FBEEEAD}"/>
+              </a:ext>
+            </a:extLst>
+          </p:cNvPr>
+          <p:cNvCxnSpPr/>
+          <p:nvPr/>
+        </p:nvCxnSpPr>
+        <p:spPr>
+          <a:xfrm>
+            <a:off x="4703057" y="1620277"/>
+            <a:ext cx="0" cy="3780000"/>
+          </a:xfrm>
+          <a:prstGeom prst="line">
+            <a:avLst/>
+          </a:prstGeom>
+        </p:spPr>
+        <p:style>
+          <a:lnRef idx="1">
+            <a:schemeClr val="accent1"/>
+          </a:lnRef>
+          <a:fillRef idx="0">
+            <a:schemeClr val="accent1"/>
+          </a:fillRef>
+          <a:effectRef idx="0">
+            <a:schemeClr val="accent1"/>
+          </a:effectRef>
+          <a:fontRef idx="minor">
+            <a:schemeClr val="tx1"/>
+          </a:fontRef>
+        </p:style>
+      </p:cxnSp>
+      <p:sp>
+        <p:nvSpPr>
+          <p:cNvPr id="2" name="Arrow: Up 1">
+            <a:extLst>
+              <a:ext uri="{FF2B5EF4-FFF2-40B4-BE49-F238E27FC236}">
+                <a16:creationId xmlns:a16="http://schemas.microsoft.com/office/drawing/2014/main" id="{D2623F72-DC31-4530-B9C1-944DDDD71057}"/>
+              </a:ext>
+            </a:extLst>
+          </p:cNvPr>
+          <p:cNvSpPr/>
+          <p:nvPr/>
+        </p:nvSpPr>
+        <p:spPr>
+          <a:xfrm rot="10800000">
+            <a:off x="4610034" y="1324685"/>
+            <a:ext cx="186045" cy="375601"/>
+          </a:xfrm>
+          <a:prstGeom prst="upArrow">
+            <a:avLst/>
+          </a:prstGeom>
+        </p:spPr>
+        <p:style>
+          <a:lnRef idx="2">
+            <a:schemeClr val="accent6">
+              <a:shade val="50000"/>
+            </a:schemeClr>
+          </a:lnRef>
+          <a:fillRef idx="1">
+            <a:schemeClr val="accent6"/>
+          </a:fillRef>
+          <a:effectRef idx="0">
+            <a:schemeClr val="accent6"/>
+          </a:effectRef>
+          <a:fontRef idx="minor">
+            <a:schemeClr val="lt1"/>
+          </a:fontRef>
+        </p:style>
+        <p:txBody>
+          <a:bodyPr rtlCol="0" anchor="ctr"/>
+          <a:lstStyle/>
+          <a:p>
+            <a:pPr algn="ctr"/>
+            <a:endParaRPr lang="en-GB"/>
+          </a:p>
+        </p:txBody>
+      </p:sp>
+      <p:sp>
+        <p:nvSpPr>
+          <p:cNvPr id="9" name="TextBox 8">
+            <a:extLst>
+              <a:ext uri="{FF2B5EF4-FFF2-40B4-BE49-F238E27FC236}">
+                <a16:creationId xmlns:a16="http://schemas.microsoft.com/office/drawing/2014/main" id="{0EA4ECCE-5747-4403-B535-582D8C05EA5D}"/>
+              </a:ext>
+            </a:extLst>
+          </p:cNvPr>
+          <p:cNvSpPr txBox="1"/>
+          <p:nvPr/>
+        </p:nvSpPr>
+        <p:spPr>
+          <a:xfrm>
+            <a:off x="4403935" y="914589"/>
+            <a:ext cx="558166" cy="338554"/>
+          </a:xfrm>
+          <a:prstGeom prst="rect">
+            <a:avLst/>
+          </a:prstGeom>
+          <a:noFill/>
+        </p:spPr>
+        <p:txBody>
+          <a:bodyPr wrap="none" rtlCol="0">
+            <a:spAutoFit/>
+          </a:bodyPr>
+          <a:lstStyle/>
+          <a:p>
+            <a:pPr algn="ctr"/>
+            <a:r>
+              <a:rPr lang="en-GB" sz="1600" dirty="0">
+                <a:solidFill>
+                  <a:schemeClr val="bg1"/>
+                </a:solidFill>
+                <a:latin typeface="Agency FB" panose="020B0503020202020204" pitchFamily="34" charset="0"/>
+              </a:rPr>
+              <a:t>Today</a:t>
+            </a:r>
+            <a:endParaRPr lang="en-GB" dirty="0">
+              <a:solidFill>
+                <a:schemeClr val="bg1"/>
+              </a:solidFill>
+              <a:latin typeface="Agency FB" panose="020B0503020202020204" pitchFamily="34" charset="0"/>
+            </a:endParaRPr>
+          </a:p>
+        </p:txBody>
+      </p:sp>
+      <p:sp>
+        <p:nvSpPr>
+          <p:cNvPr id="10" name="Title 1">
+            <a:extLst>
+              <a:ext uri="{FF2B5EF4-FFF2-40B4-BE49-F238E27FC236}">
+                <a16:creationId xmlns:a16="http://schemas.microsoft.com/office/drawing/2014/main" id="{AC0038EB-4D99-47BE-82C5-887B49C1E4FB}"/>
               </a:ext>
             </a:extLst>
           </p:cNvPr>
@@ -4805,15 +6300,15 @@
         </p:nvSpPr>
         <p:spPr>
           <a:xfrm>
-            <a:off x="2445469" y="1819224"/>
-            <a:ext cx="7301061" cy="3219551"/>
+            <a:off x="176173" y="165275"/>
+            <a:ext cx="7301061" cy="584049"/>
           </a:xfrm>
           <a:prstGeom prst="rect">
             <a:avLst/>
           </a:prstGeom>
         </p:spPr>
         <p:txBody>
-          <a:bodyPr vert="horz" lIns="91440" tIns="45720" rIns="91440" bIns="45720" rtlCol="0" anchor="ctr">
+          <a:bodyPr vert="horz" lIns="91440" tIns="45720" rIns="91440" bIns="45720" rtlCol="0" anchor="t">
             <a:noAutofit/>
           </a:bodyPr>
           <a:lstStyle>
@@ -4836,6 +6331,7 @@
             </a:lvl1pPr>
           </a:lstStyle>
           <a:p>
+            <a:pPr algn="l"/>
             <a:r>
               <a:rPr lang="en-GB" sz="3200" b="1" dirty="0">
                 <a:solidFill>
@@ -4843,7 +6339,247 @@
                 </a:solidFill>
                 <a:latin typeface="Agency FB" panose="020B0503020202020204" pitchFamily="34" charset="0"/>
               </a:rPr>
-              <a:t>Gannt Chart</a:t>
+              <a:t>Where am I?</a:t>
+            </a:r>
+          </a:p>
+        </p:txBody>
+      </p:sp>
+      <p:sp>
+        <p:nvSpPr>
+          <p:cNvPr id="11" name="TextBox 10">
+            <a:extLst>
+              <a:ext uri="{FF2B5EF4-FFF2-40B4-BE49-F238E27FC236}">
+                <a16:creationId xmlns:a16="http://schemas.microsoft.com/office/drawing/2014/main" id="{20182A6F-25F7-49FD-BBAC-0AB991F34777}"/>
+              </a:ext>
+            </a:extLst>
+          </p:cNvPr>
+          <p:cNvSpPr txBox="1"/>
+          <p:nvPr/>
+        </p:nvSpPr>
+        <p:spPr>
+          <a:xfrm>
+            <a:off x="8269623" y="1297043"/>
+            <a:ext cx="3746194" cy="4185761"/>
+          </a:xfrm>
+          <a:prstGeom prst="rect">
+            <a:avLst/>
+          </a:prstGeom>
+          <a:noFill/>
+        </p:spPr>
+        <p:txBody>
+          <a:bodyPr wrap="square" rtlCol="0" anchor="ctr">
+            <a:spAutoFit/>
+          </a:bodyPr>
+          <a:lstStyle/>
+          <a:p>
+            <a:r>
+              <a:rPr lang="en-GB" sz="2400" b="1" dirty="0">
+                <a:solidFill>
+                  <a:schemeClr val="bg1"/>
+                </a:solidFill>
+                <a:latin typeface="Agency FB" panose="020B0503020202020204" pitchFamily="34" charset="0"/>
+              </a:rPr>
+              <a:t>Project Plan:</a:t>
+            </a:r>
+          </a:p>
+          <a:p>
+            <a:endParaRPr lang="en-GB" sz="200" dirty="0">
+              <a:solidFill>
+                <a:schemeClr val="bg1"/>
+              </a:solidFill>
+              <a:latin typeface="Agency FB" panose="020B0503020202020204" pitchFamily="34" charset="0"/>
+            </a:endParaRPr>
+          </a:p>
+          <a:p>
+            <a:pPr marL="285750" indent="-285750">
+              <a:buFont typeface="Wingdings" panose="05000000000000000000" pitchFamily="2" charset="2"/>
+              <a:buChar char="§"/>
+            </a:pPr>
+            <a:r>
+              <a:rPr lang="en-GB" sz="1600" b="1" dirty="0">
+                <a:solidFill>
+                  <a:schemeClr val="bg1"/>
+                </a:solidFill>
+                <a:latin typeface="Bahnschrift Light Condensed" panose="020B0502040204020203" pitchFamily="34" charset="0"/>
+              </a:rPr>
+              <a:t>Artifact</a:t>
+            </a:r>
+          </a:p>
+          <a:p>
+            <a:pPr marL="742950" lvl="1" indent="-285750">
+              <a:buFont typeface="Wingdings" panose="05000000000000000000" pitchFamily="2" charset="2"/>
+              <a:buChar char="ü"/>
+            </a:pPr>
+            <a:r>
+              <a:rPr lang="en-GB" sz="1600" dirty="0">
+                <a:solidFill>
+                  <a:schemeClr val="bg1"/>
+                </a:solidFill>
+                <a:latin typeface="Bahnschrift Light Condensed" panose="020B0502040204020203" pitchFamily="34" charset="0"/>
+              </a:rPr>
+              <a:t>Setup Version Control</a:t>
+            </a:r>
+          </a:p>
+          <a:p>
+            <a:pPr marL="742950" lvl="1" indent="-285750">
+              <a:buFont typeface="Wingdings" panose="05000000000000000000" pitchFamily="2" charset="2"/>
+              <a:buChar char="ü"/>
+            </a:pPr>
+            <a:r>
+              <a:rPr lang="en-GB" sz="1600" dirty="0">
+                <a:solidFill>
+                  <a:schemeClr val="bg1"/>
+                </a:solidFill>
+                <a:latin typeface="Bahnschrift Light Condensed" panose="020B0502040204020203" pitchFamily="34" charset="0"/>
+              </a:rPr>
+              <a:t>Setup Unity Project</a:t>
+            </a:r>
+          </a:p>
+          <a:p>
+            <a:pPr marL="742950" lvl="1" indent="-285750">
+              <a:buFont typeface="Wingdings" panose="05000000000000000000" pitchFamily="2" charset="2"/>
+              <a:buChar char="ü"/>
+            </a:pPr>
+            <a:r>
+              <a:rPr lang="en-GB" sz="1600" dirty="0">
+                <a:solidFill>
+                  <a:schemeClr val="bg1"/>
+                </a:solidFill>
+                <a:latin typeface="Bahnschrift Light Condensed" panose="020B0502040204020203" pitchFamily="34" charset="0"/>
+              </a:rPr>
+              <a:t>Get LSL working across devices</a:t>
+            </a:r>
+          </a:p>
+          <a:p>
+            <a:pPr marL="742950" lvl="1" indent="-285750">
+              <a:buFont typeface="Wingdings" panose="05000000000000000000" pitchFamily="2" charset="2"/>
+              <a:buChar char="q"/>
+            </a:pPr>
+            <a:r>
+              <a:rPr lang="en-GB" sz="1600" dirty="0">
+                <a:solidFill>
+                  <a:schemeClr val="bg1"/>
+                </a:solidFill>
+                <a:latin typeface="Bahnschrift Light Condensed" panose="020B0502040204020203" pitchFamily="34" charset="0"/>
+              </a:rPr>
+              <a:t>Implement Neural Network for data analysis</a:t>
+            </a:r>
+          </a:p>
+          <a:p>
+            <a:pPr marL="1200150" lvl="2" indent="-285750">
+              <a:buFont typeface="Wingdings" panose="05000000000000000000" pitchFamily="2" charset="2"/>
+              <a:buChar char="ü"/>
+            </a:pPr>
+            <a:r>
+              <a:rPr lang="en-GB" sz="1200" dirty="0">
+                <a:solidFill>
+                  <a:schemeClr val="bg1"/>
+                </a:solidFill>
+                <a:latin typeface="Bahnschrift Light Condensed" panose="020B0502040204020203" pitchFamily="34" charset="0"/>
+              </a:rPr>
+              <a:t>Setup Tensorflow online analysis through Unity</a:t>
+            </a:r>
+          </a:p>
+          <a:p>
+            <a:pPr marL="1200150" lvl="2" indent="-285750">
+              <a:buFont typeface="Wingdings" panose="05000000000000000000" pitchFamily="2" charset="2"/>
+              <a:buChar char="q"/>
+            </a:pPr>
+            <a:r>
+              <a:rPr lang="en-GB" sz="1200" dirty="0">
+                <a:solidFill>
+                  <a:schemeClr val="bg1"/>
+                </a:solidFill>
+                <a:latin typeface="Bahnschrift Light Condensed" panose="020B0502040204020203" pitchFamily="34" charset="0"/>
+              </a:rPr>
+              <a:t>Design and train a network using offline EEG / EMG data</a:t>
+            </a:r>
+          </a:p>
+          <a:p>
+            <a:pPr marL="285750" indent="-285750">
+              <a:buFont typeface="Wingdings" panose="05000000000000000000" pitchFamily="2" charset="2"/>
+              <a:buChar char="§"/>
+            </a:pPr>
+            <a:endParaRPr lang="en-GB" sz="1600" dirty="0">
+              <a:solidFill>
+                <a:schemeClr val="bg1"/>
+              </a:solidFill>
+              <a:latin typeface="Bahnschrift Light Condensed" panose="020B0502040204020203" pitchFamily="34" charset="0"/>
+            </a:endParaRPr>
+          </a:p>
+          <a:p>
+            <a:pPr marL="285750" indent="-285750">
+              <a:buFont typeface="Wingdings" panose="05000000000000000000" pitchFamily="2" charset="2"/>
+              <a:buChar char="§"/>
+            </a:pPr>
+            <a:r>
+              <a:rPr lang="en-GB" sz="1600" b="1" dirty="0">
+                <a:solidFill>
+                  <a:schemeClr val="bg1"/>
+                </a:solidFill>
+                <a:latin typeface="Bahnschrift Light Condensed" panose="020B0502040204020203" pitchFamily="34" charset="0"/>
+              </a:rPr>
+              <a:t>Dissertation</a:t>
+            </a:r>
+          </a:p>
+          <a:p>
+            <a:pPr marL="742950" lvl="1" indent="-285750">
+              <a:buFont typeface="Wingdings" panose="05000000000000000000" pitchFamily="2" charset="2"/>
+              <a:buChar char="ü"/>
+            </a:pPr>
+            <a:r>
+              <a:rPr lang="en-GB" sz="1600" dirty="0">
+                <a:solidFill>
+                  <a:schemeClr val="bg1"/>
+                </a:solidFill>
+                <a:latin typeface="Bahnschrift Light Condensed" panose="020B0502040204020203" pitchFamily="34" charset="0"/>
+              </a:rPr>
+              <a:t>Ethics / Risk assessment hand in.</a:t>
+            </a:r>
+          </a:p>
+          <a:p>
+            <a:pPr marL="742950" lvl="1" indent="-285750">
+              <a:buFont typeface="Wingdings" panose="05000000000000000000" pitchFamily="2" charset="2"/>
+              <a:buChar char="ü"/>
+            </a:pPr>
+            <a:r>
+              <a:rPr lang="en-GB" sz="1600" dirty="0">
+                <a:solidFill>
+                  <a:schemeClr val="bg1"/>
+                </a:solidFill>
+                <a:latin typeface="Bahnschrift Light Condensed" panose="020B0502040204020203" pitchFamily="34" charset="0"/>
+              </a:rPr>
+              <a:t>Dissertation Draft</a:t>
+            </a:r>
+          </a:p>
+          <a:p>
+            <a:pPr marL="742950" lvl="1" indent="-285750">
+              <a:buFont typeface="Wingdings" panose="05000000000000000000" pitchFamily="2" charset="2"/>
+              <a:buChar char="ü"/>
+            </a:pPr>
+            <a:r>
+              <a:rPr lang="en-GB" sz="1600" dirty="0">
+                <a:solidFill>
+                  <a:schemeClr val="bg1"/>
+                </a:solidFill>
+                <a:latin typeface="Bahnschrift Light Condensed" panose="020B0502040204020203" pitchFamily="34" charset="0"/>
+              </a:rPr>
+              <a:t>Introduction – (draft)</a:t>
+            </a:r>
+          </a:p>
+          <a:p>
+            <a:pPr marL="742950" lvl="1" indent="-285750">
+              <a:buFont typeface="Wingdings" panose="05000000000000000000" pitchFamily="2" charset="2"/>
+              <a:buChar char="ü"/>
+            </a:pPr>
+            <a:r>
+              <a:rPr lang="en-GB" sz="1600" dirty="0">
+                <a:solidFill>
+                  <a:schemeClr val="bg1"/>
+                </a:solidFill>
+                <a:latin typeface="Bahnschrift Light Condensed" panose="020B0502040204020203" pitchFamily="34" charset="0"/>
+              </a:rPr>
+              <a:t>Literature Review – (draft)</a:t>
             </a:r>
           </a:p>
         </p:txBody>
@@ -4880,10 +6616,10 @@
       </p:grpSpPr>
       <p:pic>
         <p:nvPicPr>
-          <p:cNvPr id="6" name="Picture 2">
-            <a:extLst>
-              <a:ext uri="{FF2B5EF4-FFF2-40B4-BE49-F238E27FC236}">
-                <a16:creationId xmlns:a16="http://schemas.microsoft.com/office/drawing/2014/main" id="{C750F59D-7D99-4171-9C70-7F2B3106D5FE}"/>
+          <p:cNvPr id="8" name="Picture 2">
+            <a:extLst>
+              <a:ext uri="{FF2B5EF4-FFF2-40B4-BE49-F238E27FC236}">
+                <a16:creationId xmlns:a16="http://schemas.microsoft.com/office/drawing/2014/main" id="{7B27250D-C4B9-4F74-8250-DEF2ED58B75F}"/>
               </a:ext>
             </a:extLst>
           </p:cNvPr>
@@ -4907,20 +6643,33 @@
         </p:blipFill>
         <p:spPr>
           <a:xfrm>
-            <a:off x="20" y="10"/>
+            <a:off x="0" y="10"/>
             <a:ext cx="12191980" cy="6857990"/>
           </a:xfrm>
           <a:prstGeom prst="rect">
             <a:avLst/>
           </a:prstGeom>
+          <a:ln w="127000" cap="sq">
+            <a:solidFill>
+              <a:srgbClr val="000000"/>
+            </a:solidFill>
+            <a:miter lim="800000"/>
+          </a:ln>
+          <a:effectLst>
+            <a:innerShdw blurRad="63500" dist="50800" dir="18900000">
+              <a:prstClr val="black">
+                <a:alpha val="50000"/>
+              </a:prstClr>
+            </a:innerShdw>
+          </a:effectLst>
         </p:spPr>
       </p:pic>
       <p:sp>
         <p:nvSpPr>
-          <p:cNvPr id="7" name="Title 1">
-            <a:extLst>
-              <a:ext uri="{FF2B5EF4-FFF2-40B4-BE49-F238E27FC236}">
-                <a16:creationId xmlns:a16="http://schemas.microsoft.com/office/drawing/2014/main" id="{37DC246B-15A1-4ECD-B936-5B3331447342}"/>
+          <p:cNvPr id="9" name="Title 1">
+            <a:extLst>
+              <a:ext uri="{FF2B5EF4-FFF2-40B4-BE49-F238E27FC236}">
+                <a16:creationId xmlns:a16="http://schemas.microsoft.com/office/drawing/2014/main" id="{828B5B6D-1CE8-4CDF-907C-BCA50AF7CD0D}"/>
               </a:ext>
             </a:extLst>
           </p:cNvPr>
@@ -4931,15 +6680,15 @@
         </p:nvSpPr>
         <p:spPr>
           <a:xfrm>
-            <a:off x="2445469" y="1819224"/>
-            <a:ext cx="7301061" cy="3219551"/>
+            <a:off x="176173" y="165275"/>
+            <a:ext cx="7301061" cy="584049"/>
           </a:xfrm>
           <a:prstGeom prst="rect">
             <a:avLst/>
           </a:prstGeom>
         </p:spPr>
         <p:txBody>
-          <a:bodyPr vert="horz" lIns="91440" tIns="45720" rIns="91440" bIns="45720" rtlCol="0" anchor="ctr">
+          <a:bodyPr vert="horz" lIns="91440" tIns="45720" rIns="91440" bIns="45720" rtlCol="0" anchor="t">
             <a:noAutofit/>
           </a:bodyPr>
           <a:lstStyle>
@@ -4962,6 +6711,7 @@
             </a:lvl1pPr>
           </a:lstStyle>
           <a:p>
+            <a:pPr algn="l"/>
             <a:r>
               <a:rPr lang="en-GB" sz="3200" b="1" dirty="0">
                 <a:solidFill>
@@ -4976,10 +6726,10 @@
       </p:sp>
       <p:sp>
         <p:nvSpPr>
-          <p:cNvPr id="4" name="TextBox 3">
-            <a:extLst>
-              <a:ext uri="{FF2B5EF4-FFF2-40B4-BE49-F238E27FC236}">
-                <a16:creationId xmlns:a16="http://schemas.microsoft.com/office/drawing/2014/main" id="{259D4CF7-5D6E-4210-B9D9-55BC0FB6DB7E}"/>
+          <p:cNvPr id="10" name="TextBox 9">
+            <a:extLst>
+              <a:ext uri="{FF2B5EF4-FFF2-40B4-BE49-F238E27FC236}">
+                <a16:creationId xmlns:a16="http://schemas.microsoft.com/office/drawing/2014/main" id="{10DD59FC-3D86-4A54-81F4-17F0EEE4C217}"/>
               </a:ext>
             </a:extLst>
           </p:cNvPr>
@@ -4988,8 +6738,8 @@
         </p:nvSpPr>
         <p:spPr>
           <a:xfrm>
-            <a:off x="184067" y="124692"/>
-            <a:ext cx="3026726" cy="1754326"/>
+            <a:off x="176173" y="1326781"/>
+            <a:ext cx="3746194" cy="3077766"/>
           </a:xfrm>
           <a:prstGeom prst="rect">
             <a:avLst/>
@@ -4997,68 +6747,383 @@
           <a:noFill/>
         </p:spPr>
         <p:txBody>
-          <a:bodyPr wrap="none" rtlCol="0">
+          <a:bodyPr wrap="square" rtlCol="0" anchor="t">
             <a:spAutoFit/>
           </a:bodyPr>
           <a:lstStyle/>
           <a:p>
-            <a:pPr marL="285750" indent="-285750">
+            <a:r>
+              <a:rPr lang="en-GB" sz="2400" b="1" dirty="0">
+                <a:solidFill>
+                  <a:schemeClr val="bg1"/>
+                </a:solidFill>
+                <a:latin typeface="Agency FB" panose="020B0503020202020204" pitchFamily="34" charset="0"/>
+              </a:rPr>
+              <a:t>Next few weeks:</a:t>
+            </a:r>
+          </a:p>
+          <a:p>
+            <a:pPr marL="171450" indent="-171450">
               <a:buFont typeface="Arial" panose="020B0604020202020204" pitchFamily="34" charset="0"/>
               <a:buChar char="•"/>
             </a:pPr>
             <a:r>
-              <a:rPr lang="en-GB" dirty="0">
+              <a:rPr lang="en-GB" sz="1600" b="1" dirty="0">
                 <a:solidFill>
                   <a:schemeClr val="bg1"/>
                 </a:solidFill>
+                <a:latin typeface="Bahnschrift Light Condensed" panose="020B0502040204020203" pitchFamily="34" charset="0"/>
               </a:rPr>
-              <a:t>Early Plan (next few weeks)</a:t>
-            </a:r>
-          </a:p>
-          <a:p>
-            <a:endParaRPr lang="en-GB" dirty="0">
+              <a:t>Artifact</a:t>
+            </a:r>
+          </a:p>
+          <a:p>
+            <a:pPr marL="628650" lvl="1" indent="-171450">
+              <a:buFont typeface="Arial" panose="020B0604020202020204" pitchFamily="34" charset="0"/>
+              <a:buChar char="•"/>
+            </a:pPr>
+            <a:r>
+              <a:rPr lang="en-GB" sz="1200" b="1" dirty="0">
+                <a:solidFill>
+                  <a:schemeClr val="bg1"/>
+                </a:solidFill>
+                <a:latin typeface="Bahnschrift Light Condensed" panose="020B0502040204020203" pitchFamily="34" charset="0"/>
+              </a:rPr>
+              <a:t>Get a working offline analysis model for EEG motor-imagery classification.</a:t>
+            </a:r>
+          </a:p>
+          <a:p>
+            <a:pPr marL="628650" lvl="1" indent="-171450">
+              <a:buFont typeface="Arial" panose="020B0604020202020204" pitchFamily="34" charset="0"/>
+              <a:buChar char="•"/>
+            </a:pPr>
+            <a:r>
+              <a:rPr lang="en-GB" sz="1200" b="1" dirty="0">
+                <a:solidFill>
+                  <a:schemeClr val="bg1"/>
+                </a:solidFill>
+                <a:latin typeface="Bahnschrift Light Condensed" panose="020B0502040204020203" pitchFamily="34" charset="0"/>
+              </a:rPr>
+              <a:t>Then get this working in real time with Unity, though this will still be feeding in offline data.</a:t>
+            </a:r>
+          </a:p>
+          <a:p>
+            <a:pPr marL="628650" lvl="1" indent="-171450">
+              <a:buFont typeface="Arial" panose="020B0604020202020204" pitchFamily="34" charset="0"/>
+              <a:buChar char="•"/>
+            </a:pPr>
+            <a:r>
+              <a:rPr lang="en-GB" sz="1200" b="1" dirty="0">
+                <a:solidFill>
+                  <a:schemeClr val="bg1"/>
+                </a:solidFill>
+                <a:latin typeface="Bahnschrift Light Condensed" panose="020B0502040204020203" pitchFamily="34" charset="0"/>
+              </a:rPr>
+              <a:t>Do the same for the </a:t>
+            </a:r>
+            <a:r>
+              <a:rPr lang="en-GB" sz="1200" b="1" dirty="0" err="1">
+                <a:solidFill>
+                  <a:schemeClr val="bg1"/>
+                </a:solidFill>
+                <a:latin typeface="Bahnschrift Light Condensed" panose="020B0502040204020203" pitchFamily="34" charset="0"/>
+              </a:rPr>
+              <a:t>Emotibit</a:t>
+            </a:r>
+            <a:r>
+              <a:rPr lang="en-GB" sz="1200" b="1" dirty="0">
+                <a:solidFill>
+                  <a:schemeClr val="bg1"/>
+                </a:solidFill>
+                <a:latin typeface="Bahnschrift Light Condensed" panose="020B0502040204020203" pitchFamily="34" charset="0"/>
+              </a:rPr>
+              <a:t>, EMG data.</a:t>
+            </a:r>
+          </a:p>
+          <a:p>
+            <a:pPr marL="628650" lvl="1" indent="-171450">
+              <a:buFont typeface="Arial" panose="020B0604020202020204" pitchFamily="34" charset="0"/>
+              <a:buChar char="•"/>
+            </a:pPr>
+            <a:endParaRPr lang="en-GB" sz="1200" b="1" dirty="0">
               <a:solidFill>
                 <a:schemeClr val="bg1"/>
               </a:solidFill>
+              <a:latin typeface="Bahnschrift Light Condensed" panose="020B0502040204020203" pitchFamily="34" charset="0"/>
             </a:endParaRPr>
           </a:p>
           <a:p>
-            <a:pPr marL="285750" indent="-285750">
+            <a:pPr marL="171450" indent="-171450">
               <a:buFont typeface="Arial" panose="020B0604020202020204" pitchFamily="34" charset="0"/>
               <a:buChar char="•"/>
             </a:pPr>
             <a:r>
-              <a:rPr lang="en-GB" dirty="0">
+              <a:rPr lang="en-GB" sz="1600" b="1" dirty="0">
                 <a:solidFill>
                   <a:schemeClr val="bg1"/>
                 </a:solidFill>
+                <a:latin typeface="Bahnschrift Light Condensed" panose="020B0502040204020203" pitchFamily="34" charset="0"/>
               </a:rPr>
-              <a:t>Late Plan (till the end)</a:t>
-            </a:r>
-          </a:p>
-          <a:p>
-            <a:pPr marL="742950" lvl="1" indent="-285750">
+              <a:t>Dissertation</a:t>
+            </a:r>
+          </a:p>
+          <a:p>
+            <a:pPr marL="628650" lvl="1" indent="-171450">
               <a:buFont typeface="Arial" panose="020B0604020202020204" pitchFamily="34" charset="0"/>
               <a:buChar char="•"/>
             </a:pPr>
-            <a:endParaRPr lang="en-GB" dirty="0">
+            <a:r>
+              <a:rPr lang="en-GB" sz="1200" b="1" dirty="0">
+                <a:solidFill>
+                  <a:schemeClr val="bg1"/>
+                </a:solidFill>
+                <a:latin typeface="Bahnschrift Light Condensed" panose="020B0502040204020203" pitchFamily="34" charset="0"/>
+              </a:rPr>
+              <a:t>Polish up drafted sections and continue the literature review.</a:t>
+            </a:r>
+          </a:p>
+          <a:p>
+            <a:pPr marL="628650" lvl="1" indent="-171450">
+              <a:buFont typeface="Arial" panose="020B0604020202020204" pitchFamily="34" charset="0"/>
+              <a:buChar char="•"/>
+            </a:pPr>
+            <a:r>
+              <a:rPr lang="en-GB" sz="1200" b="1" dirty="0">
+                <a:solidFill>
+                  <a:schemeClr val="bg1"/>
+                </a:solidFill>
+                <a:latin typeface="Bahnschrift Light Condensed" panose="020B0502040204020203" pitchFamily="34" charset="0"/>
+              </a:rPr>
+              <a:t>Start </a:t>
+            </a:r>
+            <a:r>
+              <a:rPr lang="en-GB" sz="1200" b="1" dirty="0" err="1">
+                <a:solidFill>
+                  <a:schemeClr val="bg1"/>
+                </a:solidFill>
+                <a:latin typeface="Bahnschrift Light Condensed" panose="020B0502040204020203" pitchFamily="34" charset="0"/>
+              </a:rPr>
+              <a:t>methodolgy</a:t>
+            </a:r>
+            <a:endParaRPr lang="en-GB" sz="1200" b="1" dirty="0">
               <a:solidFill>
                 <a:schemeClr val="bg1"/>
               </a:solidFill>
+              <a:latin typeface="Bahnschrift Light Condensed" panose="020B0502040204020203" pitchFamily="34" charset="0"/>
             </a:endParaRPr>
           </a:p>
           <a:p>
-            <a:endParaRPr lang="en-GB" dirty="0">
+            <a:pPr marL="628650" lvl="1" indent="-171450">
+              <a:buFont typeface="Arial" panose="020B0604020202020204" pitchFamily="34" charset="0"/>
+              <a:buChar char="•"/>
+            </a:pPr>
+            <a:endParaRPr lang="en-GB" sz="1200" b="1" dirty="0">
               <a:solidFill>
                 <a:schemeClr val="bg1"/>
               </a:solidFill>
+              <a:latin typeface="Bahnschrift Light Condensed" panose="020B0502040204020203" pitchFamily="34" charset="0"/>
             </a:endParaRPr>
           </a:p>
           <a:p>
-            <a:endParaRPr lang="en-GB" dirty="0">
+            <a:pPr marL="171450" indent="-171450">
+              <a:buFont typeface="Arial" panose="020B0604020202020204" pitchFamily="34" charset="0"/>
+              <a:buChar char="•"/>
+            </a:pPr>
+            <a:endParaRPr lang="en-GB" sz="1600" b="1" dirty="0">
               <a:solidFill>
                 <a:schemeClr val="bg1"/>
               </a:solidFill>
+              <a:latin typeface="Bahnschrift Light Condensed" panose="020B0502040204020203" pitchFamily="34" charset="0"/>
+            </a:endParaRPr>
+          </a:p>
+          <a:p>
+            <a:pPr marL="171450" indent="-171450">
+              <a:buFont typeface="Arial" panose="020B0604020202020204" pitchFamily="34" charset="0"/>
+              <a:buChar char="•"/>
+            </a:pPr>
+            <a:endParaRPr lang="en-GB" sz="200" b="1" dirty="0">
+              <a:solidFill>
+                <a:schemeClr val="bg1"/>
+              </a:solidFill>
+              <a:latin typeface="Bahnschrift Light Condensed" panose="020B0502040204020203" pitchFamily="34" charset="0"/>
+            </a:endParaRPr>
+          </a:p>
+        </p:txBody>
+      </p:sp>
+      <p:sp>
+        <p:nvSpPr>
+          <p:cNvPr id="11" name="TextBox 10">
+            <a:extLst>
+              <a:ext uri="{FF2B5EF4-FFF2-40B4-BE49-F238E27FC236}">
+                <a16:creationId xmlns:a16="http://schemas.microsoft.com/office/drawing/2014/main" id="{02669571-816F-4E06-9BAF-B8325E33EC3E}"/>
+              </a:ext>
+            </a:extLst>
+          </p:cNvPr>
+          <p:cNvSpPr txBox="1"/>
+          <p:nvPr/>
+        </p:nvSpPr>
+        <p:spPr>
+          <a:xfrm>
+            <a:off x="6184076" y="1326781"/>
+            <a:ext cx="3746194" cy="2893100"/>
+          </a:xfrm>
+          <a:prstGeom prst="rect">
+            <a:avLst/>
+          </a:prstGeom>
+          <a:noFill/>
+        </p:spPr>
+        <p:txBody>
+          <a:bodyPr wrap="square" rtlCol="0" anchor="t">
+            <a:spAutoFit/>
+          </a:bodyPr>
+          <a:lstStyle/>
+          <a:p>
+            <a:r>
+              <a:rPr lang="en-GB" sz="2400" b="1" dirty="0">
+                <a:solidFill>
+                  <a:schemeClr val="bg1"/>
+                </a:solidFill>
+                <a:latin typeface="Agency FB" panose="020B0503020202020204" pitchFamily="34" charset="0"/>
+              </a:rPr>
+              <a:t>Later:</a:t>
+            </a:r>
+          </a:p>
+          <a:p>
+            <a:pPr marL="171450" indent="-171450">
+              <a:buFont typeface="Arial" panose="020B0604020202020204" pitchFamily="34" charset="0"/>
+              <a:buChar char="•"/>
+            </a:pPr>
+            <a:r>
+              <a:rPr lang="en-GB" sz="1600" b="1" dirty="0">
+                <a:solidFill>
+                  <a:schemeClr val="bg1"/>
+                </a:solidFill>
+                <a:latin typeface="Bahnschrift Light Condensed" panose="020B0502040204020203" pitchFamily="34" charset="0"/>
+              </a:rPr>
+              <a:t>Artifact</a:t>
+            </a:r>
+          </a:p>
+          <a:p>
+            <a:pPr marL="628650" lvl="1" indent="-171450">
+              <a:buFont typeface="Arial" panose="020B0604020202020204" pitchFamily="34" charset="0"/>
+              <a:buChar char="•"/>
+            </a:pPr>
+            <a:r>
+              <a:rPr lang="en-GB" sz="1200" b="1" dirty="0">
+                <a:solidFill>
+                  <a:schemeClr val="bg1"/>
+                </a:solidFill>
+                <a:latin typeface="Bahnschrift Light Condensed" panose="020B0502040204020203" pitchFamily="34" charset="0"/>
+              </a:rPr>
+              <a:t>Modify the neural networks to support the analysis of all modalities instead of just them separately.</a:t>
+            </a:r>
+          </a:p>
+          <a:p>
+            <a:pPr marL="628650" lvl="1" indent="-171450">
+              <a:buFont typeface="Arial" panose="020B0604020202020204" pitchFamily="34" charset="0"/>
+              <a:buChar char="•"/>
+            </a:pPr>
+            <a:r>
+              <a:rPr lang="en-GB" sz="1200" b="1" dirty="0">
+                <a:solidFill>
+                  <a:schemeClr val="bg1"/>
+                </a:solidFill>
+                <a:latin typeface="Bahnschrift Light Condensed" panose="020B0502040204020203" pitchFamily="34" charset="0"/>
+              </a:rPr>
+              <a:t>Train this to accomplish specific tasks, such as moving avatar skeleton bones, or influencing the difficulty of a simple game.</a:t>
+            </a:r>
+          </a:p>
+          <a:p>
+            <a:pPr marL="628650" lvl="1" indent="-171450">
+              <a:buFont typeface="Arial" panose="020B0604020202020204" pitchFamily="34" charset="0"/>
+              <a:buChar char="•"/>
+            </a:pPr>
+            <a:r>
+              <a:rPr lang="en-GB" sz="1200" b="1" dirty="0">
+                <a:solidFill>
+                  <a:schemeClr val="bg1"/>
+                </a:solidFill>
+                <a:latin typeface="Bahnschrift Light Condensed" panose="020B0502040204020203" pitchFamily="34" charset="0"/>
+              </a:rPr>
+              <a:t>Get two demonstration games built to demo the system.</a:t>
+            </a:r>
+          </a:p>
+          <a:p>
+            <a:pPr marL="628650" lvl="1" indent="-171450">
+              <a:buFont typeface="Arial" panose="020B0604020202020204" pitchFamily="34" charset="0"/>
+              <a:buChar char="•"/>
+            </a:pPr>
+            <a:endParaRPr lang="en-GB" sz="1200" b="1" dirty="0">
+              <a:solidFill>
+                <a:schemeClr val="bg1"/>
+              </a:solidFill>
+              <a:latin typeface="Bahnschrift Light Condensed" panose="020B0502040204020203" pitchFamily="34" charset="0"/>
+            </a:endParaRPr>
+          </a:p>
+          <a:p>
+            <a:pPr marL="171450" indent="-171450">
+              <a:buFont typeface="Arial" panose="020B0604020202020204" pitchFamily="34" charset="0"/>
+              <a:buChar char="•"/>
+            </a:pPr>
+            <a:r>
+              <a:rPr lang="en-GB" sz="1600" b="1" dirty="0">
+                <a:solidFill>
+                  <a:schemeClr val="bg1"/>
+                </a:solidFill>
+                <a:latin typeface="Bahnschrift Light Condensed" panose="020B0502040204020203" pitchFamily="34" charset="0"/>
+              </a:rPr>
+              <a:t>Dissertation</a:t>
+            </a:r>
+          </a:p>
+          <a:p>
+            <a:pPr marL="628650" lvl="1" indent="-171450">
+              <a:buFont typeface="Arial" panose="020B0604020202020204" pitchFamily="34" charset="0"/>
+              <a:buChar char="•"/>
+            </a:pPr>
+            <a:r>
+              <a:rPr lang="en-GB" sz="1200" b="1" dirty="0">
+                <a:solidFill>
+                  <a:schemeClr val="bg1"/>
+                </a:solidFill>
+                <a:latin typeface="Bahnschrift Light Condensed" panose="020B0502040204020203" pitchFamily="34" charset="0"/>
+              </a:rPr>
+              <a:t>Finish methodology</a:t>
+            </a:r>
+          </a:p>
+          <a:p>
+            <a:pPr marL="628650" lvl="1" indent="-171450">
+              <a:buFont typeface="Arial" panose="020B0604020202020204" pitchFamily="34" charset="0"/>
+              <a:buChar char="•"/>
+            </a:pPr>
+            <a:endParaRPr lang="en-GB" sz="1200" b="1" dirty="0">
+              <a:solidFill>
+                <a:schemeClr val="bg1"/>
+              </a:solidFill>
+              <a:latin typeface="Bahnschrift Light Condensed" panose="020B0502040204020203" pitchFamily="34" charset="0"/>
+            </a:endParaRPr>
+          </a:p>
+          <a:p>
+            <a:pPr marL="171450" indent="-171450">
+              <a:buFont typeface="Arial" panose="020B0604020202020204" pitchFamily="34" charset="0"/>
+              <a:buChar char="•"/>
+            </a:pPr>
+            <a:endParaRPr lang="en-GB" sz="1600" b="1" dirty="0">
+              <a:solidFill>
+                <a:schemeClr val="bg1"/>
+              </a:solidFill>
+              <a:latin typeface="Bahnschrift Light Condensed" panose="020B0502040204020203" pitchFamily="34" charset="0"/>
+            </a:endParaRPr>
+          </a:p>
+          <a:p>
+            <a:pPr marL="171450" indent="-171450">
+              <a:buFont typeface="Arial" panose="020B0604020202020204" pitchFamily="34" charset="0"/>
+              <a:buChar char="•"/>
+            </a:pPr>
+            <a:endParaRPr lang="en-GB" sz="200" b="1" dirty="0">
+              <a:solidFill>
+                <a:schemeClr val="bg1"/>
+              </a:solidFill>
+              <a:latin typeface="Bahnschrift Light Condensed" panose="020B0502040204020203" pitchFamily="34" charset="0"/>
             </a:endParaRPr>
           </a:p>
         </p:txBody>
@@ -5095,10 +7160,10 @@
       </p:grpSpPr>
       <p:pic>
         <p:nvPicPr>
-          <p:cNvPr id="6" name="Picture 2">
-            <a:extLst>
-              <a:ext uri="{FF2B5EF4-FFF2-40B4-BE49-F238E27FC236}">
-                <a16:creationId xmlns:a16="http://schemas.microsoft.com/office/drawing/2014/main" id="{C750F59D-7D99-4171-9C70-7F2B3106D5FE}"/>
+          <p:cNvPr id="5" name="Picture 2">
+            <a:extLst>
+              <a:ext uri="{FF2B5EF4-FFF2-40B4-BE49-F238E27FC236}">
+                <a16:creationId xmlns:a16="http://schemas.microsoft.com/office/drawing/2014/main" id="{5873DEE0-013C-4EEE-9481-24E68D72E522}"/>
               </a:ext>
             </a:extLst>
           </p:cNvPr>
@@ -5122,73 +7187,109 @@
         </p:blipFill>
         <p:spPr>
           <a:xfrm>
-            <a:off x="20" y="10"/>
+            <a:off x="0" y="10"/>
             <a:ext cx="12191980" cy="6857990"/>
           </a:xfrm>
           <a:prstGeom prst="rect">
             <a:avLst/>
           </a:prstGeom>
+          <a:ln w="127000" cap="sq">
+            <a:solidFill>
+              <a:srgbClr val="000000"/>
+            </a:solidFill>
+            <a:miter lim="800000"/>
+          </a:ln>
+          <a:effectLst>
+            <a:innerShdw blurRad="63500" dist="50800" dir="18900000">
+              <a:prstClr val="black">
+                <a:alpha val="50000"/>
+              </a:prstClr>
+            </a:innerShdw>
+          </a:effectLst>
         </p:spPr>
       </p:pic>
-      <p:sp>
-        <p:nvSpPr>
-          <p:cNvPr id="7" name="Title 1">
-            <a:extLst>
-              <a:ext uri="{FF2B5EF4-FFF2-40B4-BE49-F238E27FC236}">
-                <a16:creationId xmlns:a16="http://schemas.microsoft.com/office/drawing/2014/main" id="{37DC246B-15A1-4ECD-B936-5B3331447342}"/>
-              </a:ext>
-            </a:extLst>
-          </p:cNvPr>
-          <p:cNvSpPr txBox="1">
-            <a:spLocks/>
-          </p:cNvSpPr>
+      <p:pic>
+        <p:nvPicPr>
+          <p:cNvPr id="3" name="Picture 2">
+            <a:extLst>
+              <a:ext uri="{FF2B5EF4-FFF2-40B4-BE49-F238E27FC236}">
+                <a16:creationId xmlns:a16="http://schemas.microsoft.com/office/drawing/2014/main" id="{7EC4FD20-22D8-47D4-90C5-1277F9DF72BB}"/>
+              </a:ext>
+            </a:extLst>
+          </p:cNvPr>
+          <p:cNvPicPr>
+            <a:picLocks noChangeAspect="1"/>
+          </p:cNvPicPr>
           <p:nvPr/>
-        </p:nvSpPr>
+        </p:nvPicPr>
+        <p:blipFill rotWithShape="1">
+          <a:blip r:embed="rId3"/>
+          <a:srcRect l="1534" r="5124" b="1889"/>
+          <a:stretch/>
+        </p:blipFill>
         <p:spPr>
           <a:xfrm>
-            <a:off x="2445469" y="1819224"/>
-            <a:ext cx="7301061" cy="3219551"/>
+            <a:off x="994982" y="257172"/>
+            <a:ext cx="4482942" cy="6343651"/>
           </a:xfrm>
           <a:prstGeom prst="rect">
             <a:avLst/>
           </a:prstGeom>
+          <a:ln w="88900" cap="sq" cmpd="thickThin">
+            <a:solidFill>
+              <a:srgbClr val="000000"/>
+            </a:solidFill>
+            <a:prstDash val="solid"/>
+            <a:miter lim="800000"/>
+          </a:ln>
+          <a:effectLst>
+            <a:innerShdw blurRad="76200">
+              <a:srgbClr val="000000"/>
+            </a:innerShdw>
+          </a:effectLst>
         </p:spPr>
-        <p:txBody>
-          <a:bodyPr vert="horz" lIns="91440" tIns="45720" rIns="91440" bIns="45720" rtlCol="0" anchor="ctr">
-            <a:noAutofit/>
-          </a:bodyPr>
-          <a:lstStyle>
-            <a:lvl1pPr algn="ctr" defTabSz="914400" rtl="0" eaLnBrk="1" latinLnBrk="0" hangingPunct="1">
-              <a:lnSpc>
-                <a:spcPct val="90000"/>
-              </a:lnSpc>
-              <a:spcBef>
-                <a:spcPct val="0"/>
-              </a:spcBef>
-              <a:buNone/>
-              <a:defRPr sz="6000" kern="1200">
-                <a:solidFill>
-                  <a:schemeClr val="tx1"/>
-                </a:solidFill>
-                <a:latin typeface="+mj-lt"/>
-                <a:ea typeface="+mj-ea"/>
-                <a:cs typeface="+mj-cs"/>
-              </a:defRPr>
-            </a:lvl1pPr>
-          </a:lstStyle>
-          <a:p>
-            <a:r>
-              <a:rPr lang="en-GB" sz="3200" b="1" dirty="0">
-                <a:solidFill>
-                  <a:schemeClr val="bg1"/>
-                </a:solidFill>
-                <a:latin typeface="Agency FB" panose="020B0503020202020204" pitchFamily="34" charset="0"/>
-              </a:rPr>
-              <a:t>References</a:t>
-            </a:r>
-          </a:p>
-        </p:txBody>
-      </p:sp>
+      </p:pic>
+      <p:pic>
+        <p:nvPicPr>
+          <p:cNvPr id="9" name="Picture 8">
+            <a:extLst>
+              <a:ext uri="{FF2B5EF4-FFF2-40B4-BE49-F238E27FC236}">
+                <a16:creationId xmlns:a16="http://schemas.microsoft.com/office/drawing/2014/main" id="{7EA215DD-ED7F-4F42-A37D-A1D24A68DE45}"/>
+              </a:ext>
+            </a:extLst>
+          </p:cNvPr>
+          <p:cNvPicPr>
+            <a:picLocks noChangeAspect="1"/>
+          </p:cNvPicPr>
+          <p:nvPr/>
+        </p:nvPicPr>
+        <p:blipFill rotWithShape="1">
+          <a:blip r:embed="rId4"/>
+          <a:srcRect l="1801" t="944" r="2109" b="944"/>
+          <a:stretch/>
+        </p:blipFill>
+        <p:spPr>
+          <a:xfrm>
+            <a:off x="6593481" y="257172"/>
+            <a:ext cx="4482942" cy="6343651"/>
+          </a:xfrm>
+          <a:prstGeom prst="rect">
+            <a:avLst/>
+          </a:prstGeom>
+          <a:ln w="88900" cap="sq" cmpd="thickThin">
+            <a:solidFill>
+              <a:srgbClr val="000000"/>
+            </a:solidFill>
+            <a:prstDash val="solid"/>
+            <a:miter lim="800000"/>
+          </a:ln>
+          <a:effectLst>
+            <a:innerShdw blurRad="76200">
+              <a:srgbClr val="000000"/>
+            </a:innerShdw>
+          </a:effectLst>
+        </p:spPr>
+      </p:pic>
     </p:spTree>
     <p:extLst>
       <p:ext uri="{BB962C8B-B14F-4D97-AF65-F5344CB8AC3E}">
@@ -5495,4 +7596,299 @@
     </a:ext>
   </a:extLst>
 </a:theme>
+</file>
+
+<file path=ppt/theme/theme2.xml><?xml version="1.0" encoding="utf-8"?>
+<a:theme xmlns:a="http://schemas.openxmlformats.org/drawingml/2006/main" name="Office Theme">
+  <a:themeElements>
+    <a:clrScheme name="Office">
+      <a:dk1>
+        <a:sysClr val="windowText" lastClr="000000"/>
+      </a:dk1>
+      <a:lt1>
+        <a:sysClr val="window" lastClr="FFFFFF"/>
+      </a:lt1>
+      <a:dk2>
+        <a:srgbClr val="44546A"/>
+      </a:dk2>
+      <a:lt2>
+        <a:srgbClr val="E7E6E6"/>
+      </a:lt2>
+      <a:accent1>
+        <a:srgbClr val="4472C4"/>
+      </a:accent1>
+      <a:accent2>
+        <a:srgbClr val="ED7D31"/>
+      </a:accent2>
+      <a:accent3>
+        <a:srgbClr val="A5A5A5"/>
+      </a:accent3>
+      <a:accent4>
+        <a:srgbClr val="FFC000"/>
+      </a:accent4>
+      <a:accent5>
+        <a:srgbClr val="5B9BD5"/>
+      </a:accent5>
+      <a:accent6>
+        <a:srgbClr val="70AD47"/>
+      </a:accent6>
+      <a:hlink>
+        <a:srgbClr val="0563C1"/>
+      </a:hlink>
+      <a:folHlink>
+        <a:srgbClr val="954F72"/>
+      </a:folHlink>
+    </a:clrScheme>
+    <a:fontScheme name="Office">
+      <a:majorFont>
+        <a:latin typeface="Calibri Light" panose="020F0302020204030204"/>
+        <a:ea typeface=""/>
+        <a:cs typeface=""/>
+        <a:font script="Jpan" typeface="游ゴシック Light"/>
+        <a:font script="Hang" typeface="맑은 고딕"/>
+        <a:font script="Hans" typeface="等线 Light"/>
+        <a:font script="Hant" typeface="新細明體"/>
+        <a:font script="Arab" typeface="Times New Roman"/>
+        <a:font script="Hebr" typeface="Times New Roman"/>
+        <a:font script="Thai" typeface="Angsana New"/>
+        <a:font script="Ethi" typeface="Nyala"/>
+        <a:font script="Beng" typeface="Vrinda"/>
+        <a:font script="Gujr" typeface="Shruti"/>
+        <a:font script="Khmr" typeface="MoolBoran"/>
+        <a:font script="Knda" typeface="Tunga"/>
+        <a:font script="Guru" typeface="Raavi"/>
+        <a:font script="Cans" typeface="Euphemia"/>
+        <a:font script="Cher" typeface="Plantagenet Cherokee"/>
+        <a:font script="Yiii" typeface="Microsoft Yi Baiti"/>
+        <a:font script="Tibt" typeface="Microsoft Himalaya"/>
+        <a:font script="Thaa" typeface="MV Boli"/>
+        <a:font script="Deva" typeface="Mangal"/>
+        <a:font script="Telu" typeface="Gautami"/>
+        <a:font script="Taml" typeface="Latha"/>
+        <a:font script="Syrc" typeface="Estrangelo Edessa"/>
+        <a:font script="Orya" typeface="Kalinga"/>
+        <a:font script="Mlym" typeface="Kartika"/>
+        <a:font script="Laoo" typeface="DokChampa"/>
+        <a:font script="Sinh" typeface="Iskoola Pota"/>
+        <a:font script="Mong" typeface="Mongolian Baiti"/>
+        <a:font script="Viet" typeface="Times New Roman"/>
+        <a:font script="Uigh" typeface="Microsoft Uighur"/>
+        <a:font script="Geor" typeface="Sylfaen"/>
+        <a:font script="Armn" typeface="Arial"/>
+        <a:font script="Bugi" typeface="Leelawadee UI"/>
+        <a:font script="Bopo" typeface="Microsoft JhengHei"/>
+        <a:font script="Java" typeface="Javanese Text"/>
+        <a:font script="Lisu" typeface="Segoe UI"/>
+        <a:font script="Mymr" typeface="Myanmar Text"/>
+        <a:font script="Nkoo" typeface="Ebrima"/>
+        <a:font script="Olck" typeface="Nirmala UI"/>
+        <a:font script="Osma" typeface="Ebrima"/>
+        <a:font script="Phag" typeface="Phagspa"/>
+        <a:font script="Syrn" typeface="Estrangelo Edessa"/>
+        <a:font script="Syrj" typeface="Estrangelo Edessa"/>
+        <a:font script="Syre" typeface="Estrangelo Edessa"/>
+        <a:font script="Sora" typeface="Nirmala UI"/>
+        <a:font script="Tale" typeface="Microsoft Tai Le"/>
+        <a:font script="Talu" typeface="Microsoft New Tai Lue"/>
+        <a:font script="Tfng" typeface="Ebrima"/>
+      </a:majorFont>
+      <a:minorFont>
+        <a:latin typeface="Calibri" panose="020F0502020204030204"/>
+        <a:ea typeface=""/>
+        <a:cs typeface=""/>
+        <a:font script="Jpan" typeface="游ゴシック"/>
+        <a:font script="Hang" typeface="맑은 고딕"/>
+        <a:font script="Hans" typeface="等线"/>
+        <a:font script="Hant" typeface="新細明體"/>
+        <a:font script="Arab" typeface="Arial"/>
+        <a:font script="Hebr" typeface="Arial"/>
+        <a:font script="Thai" typeface="Cordia New"/>
+        <a:font script="Ethi" typeface="Nyala"/>
+        <a:font script="Beng" typeface="Vrinda"/>
+        <a:font script="Gujr" typeface="Shruti"/>
+        <a:font script="Khmr" typeface="DaunPenh"/>
+        <a:font script="Knda" typeface="Tunga"/>
+        <a:font script="Guru" typeface="Raavi"/>
+        <a:font script="Cans" typeface="Euphemia"/>
+        <a:font script="Cher" typeface="Plantagenet Cherokee"/>
+        <a:font script="Yiii" typeface="Microsoft Yi Baiti"/>
+        <a:font script="Tibt" typeface="Microsoft Himalaya"/>
+        <a:font script="Thaa" typeface="MV Boli"/>
+        <a:font script="Deva" typeface="Mangal"/>
+        <a:font script="Telu" typeface="Gautami"/>
+        <a:font script="Taml" typeface="Latha"/>
+        <a:font script="Syrc" typeface="Estrangelo Edessa"/>
+        <a:font script="Orya" typeface="Kalinga"/>
+        <a:font script="Mlym" typeface="Kartika"/>
+        <a:font script="Laoo" typeface="DokChampa"/>
+        <a:font script="Sinh" typeface="Iskoola Pota"/>
+        <a:font script="Mong" typeface="Mongolian Baiti"/>
+        <a:font script="Viet" typeface="Arial"/>
+        <a:font script="Uigh" typeface="Microsoft Uighur"/>
+        <a:font script="Geor" typeface="Sylfaen"/>
+        <a:font script="Armn" typeface="Arial"/>
+        <a:font script="Bugi" typeface="Leelawadee UI"/>
+        <a:font script="Bopo" typeface="Microsoft JhengHei"/>
+        <a:font script="Java" typeface="Javanese Text"/>
+        <a:font script="Lisu" typeface="Segoe UI"/>
+        <a:font script="Mymr" typeface="Myanmar Text"/>
+        <a:font script="Nkoo" typeface="Ebrima"/>
+        <a:font script="Olck" typeface="Nirmala UI"/>
+        <a:font script="Osma" typeface="Ebrima"/>
+        <a:font script="Phag" typeface="Phagspa"/>
+        <a:font script="Syrn" typeface="Estrangelo Edessa"/>
+        <a:font script="Syrj" typeface="Estrangelo Edessa"/>
+        <a:font script="Syre" typeface="Estrangelo Edessa"/>
+        <a:font script="Sora" typeface="Nirmala UI"/>
+        <a:font script="Tale" typeface="Microsoft Tai Le"/>
+        <a:font script="Talu" typeface="Microsoft New Tai Lue"/>
+        <a:font script="Tfng" typeface="Ebrima"/>
+      </a:minorFont>
+    </a:fontScheme>
+    <a:fmtScheme name="Office">
+      <a:fillStyleLst>
+        <a:solidFill>
+          <a:schemeClr val="phClr"/>
+        </a:solidFill>
+        <a:gradFill rotWithShape="1">
+          <a:gsLst>
+            <a:gs pos="0">
+              <a:schemeClr val="phClr">
+                <a:lumMod val="110000"/>
+                <a:satMod val="105000"/>
+                <a:tint val="67000"/>
+              </a:schemeClr>
+            </a:gs>
+            <a:gs pos="50000">
+              <a:schemeClr val="phClr">
+                <a:lumMod val="105000"/>
+                <a:satMod val="103000"/>
+                <a:tint val="73000"/>
+              </a:schemeClr>
+            </a:gs>
+            <a:gs pos="100000">
+              <a:schemeClr val="phClr">
+                <a:lumMod val="105000"/>
+                <a:satMod val="109000"/>
+                <a:tint val="81000"/>
+              </a:schemeClr>
+            </a:gs>
+          </a:gsLst>
+          <a:lin ang="5400000" scaled="0"/>
+        </a:gradFill>
+        <a:gradFill rotWithShape="1">
+          <a:gsLst>
+            <a:gs pos="0">
+              <a:schemeClr val="phClr">
+                <a:satMod val="103000"/>
+                <a:lumMod val="102000"/>
+                <a:tint val="94000"/>
+              </a:schemeClr>
+            </a:gs>
+            <a:gs pos="50000">
+              <a:schemeClr val="phClr">
+                <a:satMod val="110000"/>
+                <a:lumMod val="100000"/>
+                <a:shade val="100000"/>
+              </a:schemeClr>
+            </a:gs>
+            <a:gs pos="100000">
+              <a:schemeClr val="phClr">
+                <a:lumMod val="99000"/>
+                <a:satMod val="120000"/>
+                <a:shade val="78000"/>
+              </a:schemeClr>
+            </a:gs>
+          </a:gsLst>
+          <a:lin ang="5400000" scaled="0"/>
+        </a:gradFill>
+      </a:fillStyleLst>
+      <a:lnStyleLst>
+        <a:ln w="6350" cap="flat" cmpd="sng" algn="ctr">
+          <a:solidFill>
+            <a:schemeClr val="phClr"/>
+          </a:solidFill>
+          <a:prstDash val="solid"/>
+          <a:miter lim="800000"/>
+        </a:ln>
+        <a:ln w="12700" cap="flat" cmpd="sng" algn="ctr">
+          <a:solidFill>
+            <a:schemeClr val="phClr"/>
+          </a:solidFill>
+          <a:prstDash val="solid"/>
+          <a:miter lim="800000"/>
+        </a:ln>
+        <a:ln w="19050" cap="flat" cmpd="sng" algn="ctr">
+          <a:solidFill>
+            <a:schemeClr val="phClr"/>
+          </a:solidFill>
+          <a:prstDash val="solid"/>
+          <a:miter lim="800000"/>
+        </a:ln>
+      </a:lnStyleLst>
+      <a:effectStyleLst>
+        <a:effectStyle>
+          <a:effectLst/>
+        </a:effectStyle>
+        <a:effectStyle>
+          <a:effectLst/>
+        </a:effectStyle>
+        <a:effectStyle>
+          <a:effectLst>
+            <a:outerShdw blurRad="57150" dist="19050" dir="5400000" algn="ctr" rotWithShape="0">
+              <a:srgbClr val="000000">
+                <a:alpha val="63000"/>
+              </a:srgbClr>
+            </a:outerShdw>
+          </a:effectLst>
+        </a:effectStyle>
+      </a:effectStyleLst>
+      <a:bgFillStyleLst>
+        <a:solidFill>
+          <a:schemeClr val="phClr"/>
+        </a:solidFill>
+        <a:solidFill>
+          <a:schemeClr val="phClr">
+            <a:tint val="95000"/>
+            <a:satMod val="170000"/>
+          </a:schemeClr>
+        </a:solidFill>
+        <a:gradFill rotWithShape="1">
+          <a:gsLst>
+            <a:gs pos="0">
+              <a:schemeClr val="phClr">
+                <a:tint val="93000"/>
+                <a:satMod val="150000"/>
+                <a:shade val="98000"/>
+                <a:lumMod val="102000"/>
+              </a:schemeClr>
+            </a:gs>
+            <a:gs pos="50000">
+              <a:schemeClr val="phClr">
+                <a:tint val="98000"/>
+                <a:satMod val="130000"/>
+                <a:shade val="90000"/>
+                <a:lumMod val="103000"/>
+              </a:schemeClr>
+            </a:gs>
+            <a:gs pos="100000">
+              <a:schemeClr val="phClr">
+                <a:shade val="63000"/>
+                <a:satMod val="120000"/>
+              </a:schemeClr>
+            </a:gs>
+          </a:gsLst>
+          <a:lin ang="5400000" scaled="0"/>
+        </a:gradFill>
+      </a:bgFillStyleLst>
+    </a:fmtScheme>
+  </a:themeElements>
+  <a:objectDefaults/>
+  <a:extraClrSchemeLst/>
+  <a:extLst>
+    <a:ext uri="{05A4C25C-085E-4340-85A3-A5531E510DB2}">
+      <thm15:themeFamily xmlns:thm15="http://schemas.microsoft.com/office/thememl/2012/main" name="Office Theme" id="{62F939B6-93AF-4DB8-9C6B-D6C7DFDC589F}" vid="{4A3C46E8-61CC-4603-A589-7422A47A8E4A}"/>
+    </a:ext>
+  </a:extLst>
+</a:theme>
 </file>
</xml_diff>